<commit_message>
Updated persephone to osiris
</commit_message>
<xml_diff>
--- a/experiment_diagram/experiment-B-N6_interconnect.pptx
+++ b/experiment_diagram/experiment-B-N6_interconnect.pptx
@@ -816,7 +816,7 @@
           <a:p>
             <a:fld id="{50E52EA3-2204-804F-9678-85900D481E2E}" type="datetimeFigureOut">
               <a:rPr lang="en-US" smtClean="0"/>
-              <a:t>3/17/22</a:t>
+              <a:t>4/4/22</a:t>
             </a:fld>
             <a:endParaRPr lang="en-US"/>
           </a:p>
@@ -1014,7 +1014,7 @@
           <a:p>
             <a:fld id="{50E52EA3-2204-804F-9678-85900D481E2E}" type="datetimeFigureOut">
               <a:rPr lang="en-US" smtClean="0"/>
-              <a:t>3/17/22</a:t>
+              <a:t>4/4/22</a:t>
             </a:fld>
             <a:endParaRPr lang="en-US"/>
           </a:p>
@@ -1222,7 +1222,7 @@
           <a:p>
             <a:fld id="{50E52EA3-2204-804F-9678-85900D481E2E}" type="datetimeFigureOut">
               <a:rPr lang="en-US" smtClean="0"/>
-              <a:t>3/17/22</a:t>
+              <a:t>4/4/22</a:t>
             </a:fld>
             <a:endParaRPr lang="en-US"/>
           </a:p>
@@ -1420,7 +1420,7 @@
           <a:p>
             <a:fld id="{50E52EA3-2204-804F-9678-85900D481E2E}" type="datetimeFigureOut">
               <a:rPr lang="en-US" smtClean="0"/>
-              <a:t>3/17/22</a:t>
+              <a:t>4/4/22</a:t>
             </a:fld>
             <a:endParaRPr lang="en-US"/>
           </a:p>
@@ -1695,7 +1695,7 @@
           <a:p>
             <a:fld id="{50E52EA3-2204-804F-9678-85900D481E2E}" type="datetimeFigureOut">
               <a:rPr lang="en-US" smtClean="0"/>
-              <a:t>3/17/22</a:t>
+              <a:t>4/4/22</a:t>
             </a:fld>
             <a:endParaRPr lang="en-US"/>
           </a:p>
@@ -1960,7 +1960,7 @@
           <a:p>
             <a:fld id="{50E52EA3-2204-804F-9678-85900D481E2E}" type="datetimeFigureOut">
               <a:rPr lang="en-US" smtClean="0"/>
-              <a:t>3/17/22</a:t>
+              <a:t>4/4/22</a:t>
             </a:fld>
             <a:endParaRPr lang="en-US"/>
           </a:p>
@@ -2372,7 +2372,7 @@
           <a:p>
             <a:fld id="{50E52EA3-2204-804F-9678-85900D481E2E}" type="datetimeFigureOut">
               <a:rPr lang="en-US" smtClean="0"/>
-              <a:t>3/17/22</a:t>
+              <a:t>4/4/22</a:t>
             </a:fld>
             <a:endParaRPr lang="en-US"/>
           </a:p>
@@ -2513,7 +2513,7 @@
           <a:p>
             <a:fld id="{50E52EA3-2204-804F-9678-85900D481E2E}" type="datetimeFigureOut">
               <a:rPr lang="en-US" smtClean="0"/>
-              <a:t>3/17/22</a:t>
+              <a:t>4/4/22</a:t>
             </a:fld>
             <a:endParaRPr lang="en-US"/>
           </a:p>
@@ -2626,7 +2626,7 @@
           <a:p>
             <a:fld id="{50E52EA3-2204-804F-9678-85900D481E2E}" type="datetimeFigureOut">
               <a:rPr lang="en-US" smtClean="0"/>
-              <a:t>3/17/22</a:t>
+              <a:t>4/4/22</a:t>
             </a:fld>
             <a:endParaRPr lang="en-US"/>
           </a:p>
@@ -2937,7 +2937,7 @@
           <a:p>
             <a:fld id="{50E52EA3-2204-804F-9678-85900D481E2E}" type="datetimeFigureOut">
               <a:rPr lang="en-US" smtClean="0"/>
-              <a:t>3/17/22</a:t>
+              <a:t>4/4/22</a:t>
             </a:fld>
             <a:endParaRPr lang="en-US"/>
           </a:p>
@@ -3225,7 +3225,7 @@
           <a:p>
             <a:fld id="{50E52EA3-2204-804F-9678-85900D481E2E}" type="datetimeFigureOut">
               <a:rPr lang="en-US" smtClean="0"/>
-              <a:t>3/17/22</a:t>
+              <a:t>4/4/22</a:t>
             </a:fld>
             <a:endParaRPr lang="en-US"/>
           </a:p>
@@ -3466,7 +3466,7 @@
           <a:p>
             <a:fld id="{50E52EA3-2204-804F-9678-85900D481E2E}" type="datetimeFigureOut">
               <a:rPr lang="en-US" smtClean="0"/>
-              <a:t>3/17/22</a:t>
+              <a:t>4/4/22</a:t>
             </a:fld>
             <a:endParaRPr lang="en-US"/>
           </a:p>
@@ -7265,7 +7265,7 @@
                 <a:latin typeface="Calibri" panose="020F0502020204030204"/>
                 <a:sym typeface="Arial"/>
               </a:rPr>
-              <a:t>(Persephone)</a:t>
+              <a:t>(Osiris)</a:t>
             </a:r>
           </a:p>
         </p:txBody>

</xml_diff>

<commit_message>
Update experiment diagram ppt
</commit_message>
<xml_diff>
--- a/experiment_diagram/experiment-B-N6_interconnect.pptx
+++ b/experiment_diagram/experiment-B-N6_interconnect.pptx
@@ -816,7 +816,7 @@
           <a:p>
             <a:fld id="{50E52EA3-2204-804F-9678-85900D481E2E}" type="datetimeFigureOut">
               <a:rPr lang="en-US" smtClean="0"/>
-              <a:t>4/4/22</a:t>
+              <a:t>4/28/2022</a:t>
             </a:fld>
             <a:endParaRPr lang="en-US"/>
           </a:p>
@@ -1014,7 +1014,7 @@
           <a:p>
             <a:fld id="{50E52EA3-2204-804F-9678-85900D481E2E}" type="datetimeFigureOut">
               <a:rPr lang="en-US" smtClean="0"/>
-              <a:t>4/4/22</a:t>
+              <a:t>4/28/2022</a:t>
             </a:fld>
             <a:endParaRPr lang="en-US"/>
           </a:p>
@@ -1222,7 +1222,7 @@
           <a:p>
             <a:fld id="{50E52EA3-2204-804F-9678-85900D481E2E}" type="datetimeFigureOut">
               <a:rPr lang="en-US" smtClean="0"/>
-              <a:t>4/4/22</a:t>
+              <a:t>4/28/2022</a:t>
             </a:fld>
             <a:endParaRPr lang="en-US"/>
           </a:p>
@@ -1420,7 +1420,7 @@
           <a:p>
             <a:fld id="{50E52EA3-2204-804F-9678-85900D481E2E}" type="datetimeFigureOut">
               <a:rPr lang="en-US" smtClean="0"/>
-              <a:t>4/4/22</a:t>
+              <a:t>4/28/2022</a:t>
             </a:fld>
             <a:endParaRPr lang="en-US"/>
           </a:p>
@@ -1695,7 +1695,7 @@
           <a:p>
             <a:fld id="{50E52EA3-2204-804F-9678-85900D481E2E}" type="datetimeFigureOut">
               <a:rPr lang="en-US" smtClean="0"/>
-              <a:t>4/4/22</a:t>
+              <a:t>4/28/2022</a:t>
             </a:fld>
             <a:endParaRPr lang="en-US"/>
           </a:p>
@@ -1960,7 +1960,7 @@
           <a:p>
             <a:fld id="{50E52EA3-2204-804F-9678-85900D481E2E}" type="datetimeFigureOut">
               <a:rPr lang="en-US" smtClean="0"/>
-              <a:t>4/4/22</a:t>
+              <a:t>4/28/2022</a:t>
             </a:fld>
             <a:endParaRPr lang="en-US"/>
           </a:p>
@@ -2372,7 +2372,7 @@
           <a:p>
             <a:fld id="{50E52EA3-2204-804F-9678-85900D481E2E}" type="datetimeFigureOut">
               <a:rPr lang="en-US" smtClean="0"/>
-              <a:t>4/4/22</a:t>
+              <a:t>4/28/2022</a:t>
             </a:fld>
             <a:endParaRPr lang="en-US"/>
           </a:p>
@@ -2513,7 +2513,7 @@
           <a:p>
             <a:fld id="{50E52EA3-2204-804F-9678-85900D481E2E}" type="datetimeFigureOut">
               <a:rPr lang="en-US" smtClean="0"/>
-              <a:t>4/4/22</a:t>
+              <a:t>4/28/2022</a:t>
             </a:fld>
             <a:endParaRPr lang="en-US"/>
           </a:p>
@@ -2626,7 +2626,7 @@
           <a:p>
             <a:fld id="{50E52EA3-2204-804F-9678-85900D481E2E}" type="datetimeFigureOut">
               <a:rPr lang="en-US" smtClean="0"/>
-              <a:t>4/4/22</a:t>
+              <a:t>4/28/2022</a:t>
             </a:fld>
             <a:endParaRPr lang="en-US"/>
           </a:p>
@@ -2937,7 +2937,7 @@
           <a:p>
             <a:fld id="{50E52EA3-2204-804F-9678-85900D481E2E}" type="datetimeFigureOut">
               <a:rPr lang="en-US" smtClean="0"/>
-              <a:t>4/4/22</a:t>
+              <a:t>4/28/2022</a:t>
             </a:fld>
             <a:endParaRPr lang="en-US"/>
           </a:p>
@@ -3225,7 +3225,7 @@
           <a:p>
             <a:fld id="{50E52EA3-2204-804F-9678-85900D481E2E}" type="datetimeFigureOut">
               <a:rPr lang="en-US" smtClean="0"/>
-              <a:t>4/4/22</a:t>
+              <a:t>4/28/2022</a:t>
             </a:fld>
             <a:endParaRPr lang="en-US"/>
           </a:p>
@@ -3466,7 +3466,7 @@
           <a:p>
             <a:fld id="{50E52EA3-2204-804F-9678-85900D481E2E}" type="datetimeFigureOut">
               <a:rPr lang="en-US" smtClean="0"/>
-              <a:t>4/4/22</a:t>
+              <a:t>4/28/2022</a:t>
             </a:fld>
             <a:endParaRPr lang="en-US"/>
           </a:p>
@@ -4820,7 +4820,9 @@
           <a:noFill/>
           <a:ln w="25400" cap="flat" cmpd="sng" algn="ctr">
             <a:solidFill>
-              <a:srgbClr val="C00000"/>
+              <a:schemeClr val="accent4">
+                <a:lumMod val="75000"/>
+              </a:schemeClr>
             </a:solidFill>
             <a:prstDash val="sysDot"/>
             <a:miter lim="800000"/>
@@ -5134,7 +5136,9 @@
           <a:noFill/>
           <a:ln w="25400" cap="flat" cmpd="sng" algn="ctr">
             <a:solidFill>
-              <a:srgbClr val="C00000"/>
+              <a:schemeClr val="accent4">
+                <a:lumMod val="75000"/>
+              </a:schemeClr>
             </a:solidFill>
             <a:prstDash val="sysDot"/>
             <a:miter lim="800000"/>
@@ -6590,14 +6594,16 @@
             <a:avLst/>
           </a:prstGeom>
           <a:solidFill>
-            <a:schemeClr val="accent2">
+            <a:schemeClr val="accent4">
               <a:lumMod val="40000"/>
               <a:lumOff val="60000"/>
             </a:schemeClr>
           </a:solidFill>
           <a:ln w="25400">
             <a:solidFill>
-              <a:srgbClr val="C00000"/>
+              <a:schemeClr val="accent4">
+                <a:lumMod val="75000"/>
+              </a:schemeClr>
             </a:solidFill>
           </a:ln>
         </p:spPr>
@@ -6611,7 +6617,9 @@
             <a:r>
               <a:rPr lang="en-US" b="1" dirty="0">
                 <a:solidFill>
-                  <a:srgbClr val="C00000"/>
+                  <a:schemeClr val="accent4">
+                    <a:lumMod val="75000"/>
+                  </a:schemeClr>
                 </a:solidFill>
               </a:rPr>
               <a:t>12</a:t>
@@ -6744,14 +6752,16 @@
             <a:avLst/>
           </a:prstGeom>
           <a:solidFill>
-            <a:schemeClr val="accent2">
+            <a:schemeClr val="accent4">
               <a:lumMod val="40000"/>
               <a:lumOff val="60000"/>
             </a:schemeClr>
           </a:solidFill>
           <a:ln w="25400">
             <a:solidFill>
-              <a:srgbClr val="C00000"/>
+              <a:schemeClr val="accent4">
+                <a:lumMod val="75000"/>
+              </a:schemeClr>
             </a:solidFill>
           </a:ln>
         </p:spPr>
@@ -6765,7 +6775,9 @@
             <a:r>
               <a:rPr lang="en-US" b="1" dirty="0">
                 <a:solidFill>
-                  <a:srgbClr val="C00000"/>
+                  <a:schemeClr val="accent4">
+                    <a:lumMod val="75000"/>
+                  </a:schemeClr>
                 </a:solidFill>
               </a:rPr>
               <a:t>15</a:t>
@@ -7722,7 +7734,7 @@
                 <a:cs typeface="+mn-cs"/>
                 <a:sym typeface="Arial"/>
               </a:rPr>
-              <a:t>(CERF)</a:t>
+              <a:t>(CERF) </a:t>
             </a:r>
           </a:p>
         </p:txBody>

</xml_diff>

<commit_message>
Updating with GCAM-USA workflows
</commit_message>
<xml_diff>
--- a/experiment_diagram/experiment-B-N6_interconnect.pptx
+++ b/experiment_diagram/experiment-B-N6_interconnect.pptx
@@ -816,7 +816,7 @@
           <a:p>
             <a:fld id="{50E52EA3-2204-804F-9678-85900D481E2E}" type="datetimeFigureOut">
               <a:rPr lang="en-US" smtClean="0"/>
-              <a:t>4/28/22</a:t>
+              <a:t>5/2/2022</a:t>
             </a:fld>
             <a:endParaRPr lang="en-US"/>
           </a:p>
@@ -1014,7 +1014,7 @@
           <a:p>
             <a:fld id="{50E52EA3-2204-804F-9678-85900D481E2E}" type="datetimeFigureOut">
               <a:rPr lang="en-US" smtClean="0"/>
-              <a:t>4/28/22</a:t>
+              <a:t>5/2/2022</a:t>
             </a:fld>
             <a:endParaRPr lang="en-US"/>
           </a:p>
@@ -1222,7 +1222,7 @@
           <a:p>
             <a:fld id="{50E52EA3-2204-804F-9678-85900D481E2E}" type="datetimeFigureOut">
               <a:rPr lang="en-US" smtClean="0"/>
-              <a:t>4/28/22</a:t>
+              <a:t>5/2/2022</a:t>
             </a:fld>
             <a:endParaRPr lang="en-US"/>
           </a:p>
@@ -1420,7 +1420,7 @@
           <a:p>
             <a:fld id="{50E52EA3-2204-804F-9678-85900D481E2E}" type="datetimeFigureOut">
               <a:rPr lang="en-US" smtClean="0"/>
-              <a:t>4/28/22</a:t>
+              <a:t>5/2/2022</a:t>
             </a:fld>
             <a:endParaRPr lang="en-US"/>
           </a:p>
@@ -1695,7 +1695,7 @@
           <a:p>
             <a:fld id="{50E52EA3-2204-804F-9678-85900D481E2E}" type="datetimeFigureOut">
               <a:rPr lang="en-US" smtClean="0"/>
-              <a:t>4/28/22</a:t>
+              <a:t>5/2/2022</a:t>
             </a:fld>
             <a:endParaRPr lang="en-US"/>
           </a:p>
@@ -1960,7 +1960,7 @@
           <a:p>
             <a:fld id="{50E52EA3-2204-804F-9678-85900D481E2E}" type="datetimeFigureOut">
               <a:rPr lang="en-US" smtClean="0"/>
-              <a:t>4/28/22</a:t>
+              <a:t>5/2/2022</a:t>
             </a:fld>
             <a:endParaRPr lang="en-US"/>
           </a:p>
@@ -2372,7 +2372,7 @@
           <a:p>
             <a:fld id="{50E52EA3-2204-804F-9678-85900D481E2E}" type="datetimeFigureOut">
               <a:rPr lang="en-US" smtClean="0"/>
-              <a:t>4/28/22</a:t>
+              <a:t>5/2/2022</a:t>
             </a:fld>
             <a:endParaRPr lang="en-US"/>
           </a:p>
@@ -2513,7 +2513,7 @@
           <a:p>
             <a:fld id="{50E52EA3-2204-804F-9678-85900D481E2E}" type="datetimeFigureOut">
               <a:rPr lang="en-US" smtClean="0"/>
-              <a:t>4/28/22</a:t>
+              <a:t>5/2/2022</a:t>
             </a:fld>
             <a:endParaRPr lang="en-US"/>
           </a:p>
@@ -2626,7 +2626,7 @@
           <a:p>
             <a:fld id="{50E52EA3-2204-804F-9678-85900D481E2E}" type="datetimeFigureOut">
               <a:rPr lang="en-US" smtClean="0"/>
-              <a:t>4/28/22</a:t>
+              <a:t>5/2/2022</a:t>
             </a:fld>
             <a:endParaRPr lang="en-US"/>
           </a:p>
@@ -2937,7 +2937,7 @@
           <a:p>
             <a:fld id="{50E52EA3-2204-804F-9678-85900D481E2E}" type="datetimeFigureOut">
               <a:rPr lang="en-US" smtClean="0"/>
-              <a:t>4/28/22</a:t>
+              <a:t>5/2/2022</a:t>
             </a:fld>
             <a:endParaRPr lang="en-US"/>
           </a:p>
@@ -3225,7 +3225,7 @@
           <a:p>
             <a:fld id="{50E52EA3-2204-804F-9678-85900D481E2E}" type="datetimeFigureOut">
               <a:rPr lang="en-US" smtClean="0"/>
-              <a:t>4/28/22</a:t>
+              <a:t>5/2/2022</a:t>
             </a:fld>
             <a:endParaRPr lang="en-US"/>
           </a:p>
@@ -3466,7 +3466,7 @@
           <a:p>
             <a:fld id="{50E52EA3-2204-804F-9678-85900D481E2E}" type="datetimeFigureOut">
               <a:rPr lang="en-US" smtClean="0"/>
-              <a:t>4/28/22</a:t>
+              <a:t>5/2/2022</a:t>
             </a:fld>
             <a:endParaRPr lang="en-US"/>
           </a:p>
@@ -4637,8 +4637,8 @@
         </p:nvSpPr>
         <p:spPr>
           <a:xfrm>
-            <a:off x="6115522" y="3596311"/>
-            <a:ext cx="3115663" cy="307777"/>
+            <a:off x="7425486" y="3261178"/>
+            <a:ext cx="2180304" cy="523220"/>
           </a:xfrm>
           <a:prstGeom prst="rect">
             <a:avLst/>
@@ -4665,46 +4665,6 @@
       </p:sp>
       <p:sp>
         <p:nvSpPr>
-          <p:cNvPr id="60" name="TextBox 59">
-            <a:extLst>
-              <a:ext uri="{FF2B5EF4-FFF2-40B4-BE49-F238E27FC236}">
-                <a16:creationId xmlns:a16="http://schemas.microsoft.com/office/drawing/2014/main" id="{95697975-EAFC-EF43-8DE3-97766A57C7AE}"/>
-              </a:ext>
-            </a:extLst>
-          </p:cNvPr>
-          <p:cNvSpPr txBox="1"/>
-          <p:nvPr/>
-        </p:nvSpPr>
-        <p:spPr>
-          <a:xfrm>
-            <a:off x="4394798" y="3929802"/>
-            <a:ext cx="1293609" cy="1169551"/>
-          </a:xfrm>
-          <a:prstGeom prst="rect">
-            <a:avLst/>
-          </a:prstGeom>
-          <a:noFill/>
-        </p:spPr>
-        <p:txBody>
-          <a:bodyPr wrap="square" rtlCol="0">
-            <a:spAutoFit/>
-          </a:bodyPr>
-          <a:lstStyle/>
-          <a:p>
-            <a:pPr algn="r"/>
-            <a:r>
-              <a:rPr lang="en-US" sz="1400" b="1" dirty="0">
-                <a:solidFill>
-                  <a:schemeClr val="accent1"/>
-                </a:solidFill>
-              </a:rPr>
-              <a:t> Temperature and precipitation by state and basin</a:t>
-            </a:r>
-          </a:p>
-        </p:txBody>
-      </p:sp>
-      <p:sp>
-        <p:nvSpPr>
           <p:cNvPr id="62" name="TextBox 61">
             <a:extLst>
               <a:ext uri="{FF2B5EF4-FFF2-40B4-BE49-F238E27FC236}">
@@ -4756,7 +4716,7 @@
         </p:nvSpPr>
         <p:spPr>
           <a:xfrm>
-            <a:off x="7102899" y="4364044"/>
+            <a:off x="7635157" y="4316572"/>
             <a:ext cx="1254197" cy="738664"/>
           </a:xfrm>
           <a:prstGeom prst="rect">
@@ -5118,19 +5078,17 @@
           </p:cNvPr>
           <p:cNvCxnSpPr>
             <a:cxnSpLocks/>
-            <a:stCxn id="24" idx="0"/>
-            <a:endCxn id="54" idx="2"/>
           </p:cNvCxnSpPr>
           <p:nvPr/>
         </p:nvCxnSpPr>
         <p:spPr>
-          <a:xfrm rot="5400000" flipH="1" flipV="1">
-            <a:off x="6753993" y="2641631"/>
-            <a:ext cx="1819241" cy="3076440"/>
+          <a:xfrm flipV="1">
+            <a:off x="6816462" y="2680449"/>
+            <a:ext cx="1715841" cy="2675618"/>
           </a:xfrm>
           <a:prstGeom prst="bentConnector3">
             <a:avLst>
-              <a:gd name="adj1" fmla="val 65358"/>
+              <a:gd name="adj1" fmla="val 46157"/>
             </a:avLst>
           </a:prstGeom>
           <a:noFill/>
@@ -5225,254 +5183,41 @@
       </p:cxnSp>
       <p:cxnSp>
         <p:nvCxnSpPr>
-          <p:cNvPr id="40" name="Straight Arrow Connector 39">
-            <a:extLst>
-              <a:ext uri="{FF2B5EF4-FFF2-40B4-BE49-F238E27FC236}">
-                <a16:creationId xmlns:a16="http://schemas.microsoft.com/office/drawing/2014/main" id="{5C96A930-84BC-3041-A1C2-0838C211D222}"/>
+          <p:cNvPr id="106" name="Straight Arrow Connector 105">
+            <a:extLst>
+              <a:ext uri="{FF2B5EF4-FFF2-40B4-BE49-F238E27FC236}">
+                <a16:creationId xmlns:a16="http://schemas.microsoft.com/office/drawing/2014/main" id="{8C935D2A-E3B6-6944-9601-E9768D46D807}"/>
               </a:ext>
             </a:extLst>
           </p:cNvPr>
           <p:cNvCxnSpPr>
             <a:cxnSpLocks/>
-            <a:stCxn id="76" idx="2"/>
-            <a:endCxn id="87" idx="2"/>
+            <a:stCxn id="77" idx="2"/>
+            <a:endCxn id="24" idx="0"/>
           </p:cNvCxnSpPr>
           <p:nvPr/>
         </p:nvCxnSpPr>
         <p:spPr>
           <a:xfrm>
-            <a:off x="5034771" y="3003670"/>
-            <a:ext cx="524611" cy="767497"/>
+            <a:off x="5997106" y="3003670"/>
+            <a:ext cx="0" cy="2085801"/>
           </a:xfrm>
           <a:prstGeom prst="straightConnector1">
             <a:avLst/>
           </a:prstGeom>
-          <a:ln w="25400">
+          <a:noFill/>
+          <a:ln w="25400" cap="flat" cmpd="sng" algn="ctr">
             <a:solidFill>
               <a:schemeClr val="accent4">
                 <a:lumMod val="75000"/>
               </a:schemeClr>
             </a:solidFill>
             <a:prstDash val="dash"/>
-            <a:tailEnd type="triangle"/>
+            <a:miter lim="800000"/>
+            <a:tailEnd type="triangle" w="lg" len="lg"/>
           </a:ln>
-        </p:spPr>
-        <p:style>
-          <a:lnRef idx="1">
-            <a:schemeClr val="accent1"/>
-          </a:lnRef>
-          <a:fillRef idx="0">
-            <a:schemeClr val="accent1"/>
-          </a:fillRef>
-          <a:effectRef idx="0">
-            <a:schemeClr val="accent1"/>
-          </a:effectRef>
-          <a:fontRef idx="minor">
-            <a:schemeClr val="tx1"/>
-          </a:fontRef>
-        </p:style>
-      </p:cxnSp>
-      <p:sp>
-        <p:nvSpPr>
-          <p:cNvPr id="87" name="Oval 86">
-            <a:extLst>
-              <a:ext uri="{FF2B5EF4-FFF2-40B4-BE49-F238E27FC236}">
-                <a16:creationId xmlns:a16="http://schemas.microsoft.com/office/drawing/2014/main" id="{CA6C9072-E18D-5A47-B9D2-B883D90FF579}"/>
-              </a:ext>
-            </a:extLst>
-          </p:cNvPr>
-          <p:cNvSpPr>
-            <a:spLocks noChangeAspect="1"/>
-          </p:cNvSpPr>
-          <p:nvPr/>
-        </p:nvSpPr>
-        <p:spPr>
-          <a:xfrm>
-            <a:off x="5559382" y="3679727"/>
-            <a:ext cx="182880" cy="182880"/>
-          </a:xfrm>
-          <a:prstGeom prst="ellipse">
-            <a:avLst/>
-          </a:prstGeom>
-          <a:noFill/>
-          <a:ln w="25400">
-            <a:solidFill>
-              <a:schemeClr val="accent4">
-                <a:lumMod val="75000"/>
-              </a:schemeClr>
-            </a:solidFill>
-          </a:ln>
-        </p:spPr>
-        <p:style>
-          <a:lnRef idx="2">
-            <a:schemeClr val="accent1">
-              <a:shade val="50000"/>
-            </a:schemeClr>
-          </a:lnRef>
-          <a:fillRef idx="1">
-            <a:schemeClr val="accent1"/>
-          </a:fillRef>
-          <a:effectRef idx="0">
-            <a:schemeClr val="accent1"/>
-          </a:effectRef>
-          <a:fontRef idx="minor">
-            <a:schemeClr val="lt1"/>
-          </a:fontRef>
-        </p:style>
-        <p:txBody>
-          <a:bodyPr rtlCol="0" anchor="ctr"/>
-          <a:lstStyle/>
-          <a:p>
-            <a:pPr algn="ctr"/>
-            <a:endParaRPr lang="en-US"/>
-          </a:p>
-        </p:txBody>
-      </p:sp>
-      <p:cxnSp>
-        <p:nvCxnSpPr>
-          <p:cNvPr id="106" name="Straight Arrow Connector 105">
-            <a:extLst>
-              <a:ext uri="{FF2B5EF4-FFF2-40B4-BE49-F238E27FC236}">
-                <a16:creationId xmlns:a16="http://schemas.microsoft.com/office/drawing/2014/main" id="{8C935D2A-E3B6-6944-9601-E9768D46D807}"/>
-              </a:ext>
-            </a:extLst>
-          </p:cNvPr>
-          <p:cNvCxnSpPr>
-            <a:cxnSpLocks/>
-            <a:stCxn id="77" idx="2"/>
-            <a:endCxn id="87" idx="0"/>
-          </p:cNvCxnSpPr>
-          <p:nvPr/>
-        </p:nvCxnSpPr>
-        <p:spPr>
-          <a:xfrm flipH="1">
-            <a:off x="5650822" y="3003670"/>
-            <a:ext cx="346284" cy="676057"/>
-          </a:xfrm>
-          <a:prstGeom prst="straightConnector1">
-            <a:avLst/>
-          </a:prstGeom>
-          <a:ln w="25400">
-            <a:solidFill>
-              <a:schemeClr val="accent4">
-                <a:lumMod val="75000"/>
-              </a:schemeClr>
-            </a:solidFill>
-            <a:prstDash val="dash"/>
-            <a:tailEnd type="triangle"/>
-          </a:ln>
-        </p:spPr>
-        <p:style>
-          <a:lnRef idx="1">
-            <a:schemeClr val="accent1"/>
-          </a:lnRef>
-          <a:fillRef idx="0">
-            <a:schemeClr val="accent1"/>
-          </a:fillRef>
-          <a:effectRef idx="0">
-            <a:schemeClr val="accent1"/>
-          </a:effectRef>
-          <a:fontRef idx="minor">
-            <a:schemeClr val="tx1"/>
-          </a:fontRef>
-        </p:style>
-      </p:cxnSp>
-      <p:cxnSp>
-        <p:nvCxnSpPr>
-          <p:cNvPr id="109" name="Straight Arrow Connector 108">
-            <a:extLst>
-              <a:ext uri="{FF2B5EF4-FFF2-40B4-BE49-F238E27FC236}">
-                <a16:creationId xmlns:a16="http://schemas.microsoft.com/office/drawing/2014/main" id="{61B45BE4-D6DA-8F48-B61A-51C2C4E75204}"/>
-              </a:ext>
-            </a:extLst>
-          </p:cNvPr>
-          <p:cNvCxnSpPr>
-            <a:cxnSpLocks/>
-            <a:stCxn id="78" idx="2"/>
-            <a:endCxn id="87" idx="6"/>
-          </p:cNvCxnSpPr>
-          <p:nvPr/>
-        </p:nvCxnSpPr>
-        <p:spPr>
-          <a:xfrm flipH="1">
-            <a:off x="5742262" y="3003670"/>
-            <a:ext cx="1217179" cy="767497"/>
-          </a:xfrm>
-          <a:prstGeom prst="straightConnector1">
-            <a:avLst/>
-          </a:prstGeom>
-          <a:ln w="25400">
-            <a:solidFill>
-              <a:schemeClr val="accent4">
-                <a:lumMod val="75000"/>
-              </a:schemeClr>
-            </a:solidFill>
-            <a:prstDash val="dash"/>
-            <a:tailEnd type="triangle"/>
-          </a:ln>
-        </p:spPr>
-        <p:style>
-          <a:lnRef idx="1">
-            <a:schemeClr val="accent1"/>
-          </a:lnRef>
-          <a:fillRef idx="0">
-            <a:schemeClr val="accent1"/>
-          </a:fillRef>
-          <a:effectRef idx="0">
-            <a:schemeClr val="accent1"/>
-          </a:effectRef>
-          <a:fontRef idx="minor">
-            <a:schemeClr val="tx1"/>
-          </a:fontRef>
-        </p:style>
-      </p:cxnSp>
-      <p:cxnSp>
-        <p:nvCxnSpPr>
-          <p:cNvPr id="115" name="Straight Arrow Connector 114">
-            <a:extLst>
-              <a:ext uri="{FF2B5EF4-FFF2-40B4-BE49-F238E27FC236}">
-                <a16:creationId xmlns:a16="http://schemas.microsoft.com/office/drawing/2014/main" id="{84B73658-5FF1-BE4D-A839-5F97D1CADEF1}"/>
-              </a:ext>
-            </a:extLst>
-          </p:cNvPr>
-          <p:cNvCxnSpPr>
-            <a:cxnSpLocks/>
-            <a:stCxn id="87" idx="4"/>
-          </p:cNvCxnSpPr>
-          <p:nvPr/>
-        </p:nvCxnSpPr>
-        <p:spPr>
-          <a:xfrm>
-            <a:off x="5650822" y="3862607"/>
-            <a:ext cx="6610" cy="1764801"/>
-          </a:xfrm>
-          <a:prstGeom prst="straightConnector1">
-            <a:avLst/>
-          </a:prstGeom>
-          <a:ln w="25400">
-            <a:solidFill>
-              <a:schemeClr val="accent4">
-                <a:lumMod val="75000"/>
-              </a:schemeClr>
-            </a:solidFill>
-            <a:prstDash val="dash"/>
-            <a:tailEnd type="triangle"/>
-          </a:ln>
-        </p:spPr>
-        <p:style>
-          <a:lnRef idx="1">
-            <a:schemeClr val="accent1"/>
-          </a:lnRef>
-          <a:fillRef idx="0">
-            <a:schemeClr val="accent1"/>
-          </a:fillRef>
-          <a:effectRef idx="0">
-            <a:schemeClr val="accent1"/>
-          </a:effectRef>
-          <a:fontRef idx="minor">
-            <a:schemeClr val="tx1"/>
-          </a:fontRef>
-        </p:style>
+          <a:effectLst/>
+        </p:spPr>
       </p:cxnSp>
       <p:grpSp>
         <p:nvGrpSpPr>
@@ -6413,10 +6158,10 @@
       </p:sp>
       <p:sp>
         <p:nvSpPr>
-          <p:cNvPr id="90" name="TextBox 89">
-            <a:extLst>
-              <a:ext uri="{FF2B5EF4-FFF2-40B4-BE49-F238E27FC236}">
-                <a16:creationId xmlns:a16="http://schemas.microsoft.com/office/drawing/2014/main" id="{F72EDA13-3023-F544-9568-8433B3292E59}"/>
+          <p:cNvPr id="92" name="TextBox 91">
+            <a:extLst>
+              <a:ext uri="{FF2B5EF4-FFF2-40B4-BE49-F238E27FC236}">
+                <a16:creationId xmlns:a16="http://schemas.microsoft.com/office/drawing/2014/main" id="{C8B9378D-E069-5E43-A1D1-C030C23C26D6}"/>
               </a:ext>
             </a:extLst>
           </p:cNvPr>
@@ -6425,7 +6170,7 @@
         </p:nvSpPr>
         <p:spPr>
           <a:xfrm>
-            <a:off x="5075224" y="3118068"/>
+            <a:off x="5834702" y="3286469"/>
             <a:ext cx="297180" cy="369332"/>
           </a:xfrm>
           <a:prstGeom prst="rect">
@@ -6460,17 +6205,17 @@
                   </a:schemeClr>
                 </a:solidFill>
               </a:rPr>
-              <a:t>8</a:t>
-            </a:r>
-          </a:p>
-        </p:txBody>
-      </p:sp>
-      <p:sp>
-        <p:nvSpPr>
-          <p:cNvPr id="92" name="TextBox 91">
-            <a:extLst>
-              <a:ext uri="{FF2B5EF4-FFF2-40B4-BE49-F238E27FC236}">
-                <a16:creationId xmlns:a16="http://schemas.microsoft.com/office/drawing/2014/main" id="{C8B9378D-E069-5E43-A1D1-C030C23C26D6}"/>
+              <a:t>9</a:t>
+            </a:r>
+          </a:p>
+        </p:txBody>
+      </p:sp>
+      <p:sp>
+        <p:nvSpPr>
+          <p:cNvPr id="94" name="TextBox 93">
+            <a:extLst>
+              <a:ext uri="{FF2B5EF4-FFF2-40B4-BE49-F238E27FC236}">
+                <a16:creationId xmlns:a16="http://schemas.microsoft.com/office/drawing/2014/main" id="{0CC0ADAB-FFED-C340-A9EF-F806DD0E31E1}"/>
               </a:ext>
             </a:extLst>
           </p:cNvPr>
@@ -6479,8 +6224,62 @@
         </p:nvSpPr>
         <p:spPr>
           <a:xfrm>
-            <a:off x="5730002" y="3118068"/>
-            <a:ext cx="297180" cy="369332"/>
+            <a:off x="7743647" y="5276905"/>
+            <a:ext cx="481986" cy="369332"/>
+          </a:xfrm>
+          <a:prstGeom prst="rect">
+            <a:avLst/>
+          </a:prstGeom>
+          <a:solidFill>
+            <a:schemeClr val="accent6">
+              <a:lumMod val="40000"/>
+              <a:lumOff val="60000"/>
+            </a:schemeClr>
+          </a:solidFill>
+          <a:ln w="25400">
+            <a:solidFill>
+              <a:schemeClr val="accent6">
+                <a:lumMod val="75000"/>
+              </a:schemeClr>
+            </a:solidFill>
+          </a:ln>
+        </p:spPr>
+        <p:txBody>
+          <a:bodyPr wrap="square" rtlCol="0">
+            <a:spAutoFit/>
+          </a:bodyPr>
+          <a:lstStyle/>
+          <a:p>
+            <a:pPr algn="ctr"/>
+            <a:r>
+              <a:rPr lang="en-US" b="1" dirty="0">
+                <a:solidFill>
+                  <a:schemeClr val="accent6">
+                    <a:lumMod val="75000"/>
+                  </a:schemeClr>
+                </a:solidFill>
+              </a:rPr>
+              <a:t>11</a:t>
+            </a:r>
+          </a:p>
+        </p:txBody>
+      </p:sp>
+      <p:sp>
+        <p:nvSpPr>
+          <p:cNvPr id="95" name="TextBox 94">
+            <a:extLst>
+              <a:ext uri="{FF2B5EF4-FFF2-40B4-BE49-F238E27FC236}">
+                <a16:creationId xmlns:a16="http://schemas.microsoft.com/office/drawing/2014/main" id="{955074F7-B7FF-8B4A-A57E-D123CD396386}"/>
+              </a:ext>
+            </a:extLst>
+          </p:cNvPr>
+          <p:cNvSpPr txBox="1"/>
+          <p:nvPr/>
+        </p:nvSpPr>
+        <p:spPr>
+          <a:xfrm>
+            <a:off x="7320563" y="3522849"/>
+            <a:ext cx="481986" cy="369332"/>
           </a:xfrm>
           <a:prstGeom prst="rect">
             <a:avLst/>
@@ -6514,17 +6313,17 @@
                   </a:schemeClr>
                 </a:solidFill>
               </a:rPr>
-              <a:t>9</a:t>
-            </a:r>
-          </a:p>
-        </p:txBody>
-      </p:sp>
-      <p:sp>
-        <p:nvSpPr>
-          <p:cNvPr id="94" name="TextBox 93">
-            <a:extLst>
-              <a:ext uri="{FF2B5EF4-FFF2-40B4-BE49-F238E27FC236}">
-                <a16:creationId xmlns:a16="http://schemas.microsoft.com/office/drawing/2014/main" id="{0CC0ADAB-FFED-C340-A9EF-F806DD0E31E1}"/>
+              <a:t>12</a:t>
+            </a:r>
+          </a:p>
+        </p:txBody>
+      </p:sp>
+      <p:sp>
+        <p:nvSpPr>
+          <p:cNvPr id="96" name="TextBox 95">
+            <a:extLst>
+              <a:ext uri="{FF2B5EF4-FFF2-40B4-BE49-F238E27FC236}">
+                <a16:creationId xmlns:a16="http://schemas.microsoft.com/office/drawing/2014/main" id="{F5995287-6C5B-2049-BDBC-7533E75F350E}"/>
               </a:ext>
             </a:extLst>
           </p:cNvPr>
@@ -6533,23 +6332,21 @@
         </p:nvSpPr>
         <p:spPr>
           <a:xfrm>
-            <a:off x="7537027" y="5276905"/>
+            <a:off x="8994280" y="4040918"/>
             <a:ext cx="481986" cy="369332"/>
           </a:xfrm>
           <a:prstGeom prst="rect">
             <a:avLst/>
           </a:prstGeom>
           <a:solidFill>
-            <a:schemeClr val="accent6">
+            <a:schemeClr val="accent2">
               <a:lumMod val="40000"/>
               <a:lumOff val="60000"/>
             </a:schemeClr>
           </a:solidFill>
           <a:ln w="25400">
             <a:solidFill>
-              <a:schemeClr val="accent6">
-                <a:lumMod val="75000"/>
-              </a:schemeClr>
+              <a:srgbClr val="C00000"/>
             </a:solidFill>
           </a:ln>
         </p:spPr>
@@ -6563,22 +6360,20 @@
             <a:r>
               <a:rPr lang="en-US" b="1" dirty="0">
                 <a:solidFill>
-                  <a:schemeClr val="accent6">
-                    <a:lumMod val="75000"/>
-                  </a:schemeClr>
+                  <a:srgbClr val="C00000"/>
                 </a:solidFill>
               </a:rPr>
-              <a:t>11</a:t>
-            </a:r>
-          </a:p>
-        </p:txBody>
-      </p:sp>
-      <p:sp>
-        <p:nvSpPr>
-          <p:cNvPr id="95" name="TextBox 94">
-            <a:extLst>
-              <a:ext uri="{FF2B5EF4-FFF2-40B4-BE49-F238E27FC236}">
-                <a16:creationId xmlns:a16="http://schemas.microsoft.com/office/drawing/2014/main" id="{955074F7-B7FF-8B4A-A57E-D123CD396386}"/>
+              <a:t>13</a:t>
+            </a:r>
+          </a:p>
+        </p:txBody>
+      </p:sp>
+      <p:sp>
+        <p:nvSpPr>
+          <p:cNvPr id="97" name="TextBox 96">
+            <a:extLst>
+              <a:ext uri="{FF2B5EF4-FFF2-40B4-BE49-F238E27FC236}">
+                <a16:creationId xmlns:a16="http://schemas.microsoft.com/office/drawing/2014/main" id="{E713F805-3CF5-684C-81FB-5D5321772451}"/>
               </a:ext>
             </a:extLst>
           </p:cNvPr>
@@ -6587,7 +6382,7 @@
         </p:nvSpPr>
         <p:spPr>
           <a:xfrm>
-            <a:off x="5868650" y="4266559"/>
+            <a:off x="10692935" y="4898507"/>
             <a:ext cx="481986" cy="369332"/>
           </a:xfrm>
           <a:prstGeom prst="rect">
@@ -6622,17 +6417,17 @@
                   </a:schemeClr>
                 </a:solidFill>
               </a:rPr>
-              <a:t>12</a:t>
-            </a:r>
-          </a:p>
-        </p:txBody>
-      </p:sp>
-      <p:sp>
-        <p:nvSpPr>
-          <p:cNvPr id="96" name="TextBox 95">
-            <a:extLst>
-              <a:ext uri="{FF2B5EF4-FFF2-40B4-BE49-F238E27FC236}">
-                <a16:creationId xmlns:a16="http://schemas.microsoft.com/office/drawing/2014/main" id="{F5995287-6C5B-2049-BDBC-7533E75F350E}"/>
+              <a:t>14</a:t>
+            </a:r>
+          </a:p>
+        </p:txBody>
+      </p:sp>
+      <p:sp>
+        <p:nvSpPr>
+          <p:cNvPr id="98" name="TextBox 97">
+            <a:extLst>
+              <a:ext uri="{FF2B5EF4-FFF2-40B4-BE49-F238E27FC236}">
+                <a16:creationId xmlns:a16="http://schemas.microsoft.com/office/drawing/2014/main" id="{4E29A9A4-6A48-9348-AF91-21BA80C6C07B}"/>
               </a:ext>
             </a:extLst>
           </p:cNvPr>
@@ -6641,57 +6436,7 @@
         </p:nvSpPr>
         <p:spPr>
           <a:xfrm>
-            <a:off x="8994280" y="4040918"/>
-            <a:ext cx="481986" cy="369332"/>
-          </a:xfrm>
-          <a:prstGeom prst="rect">
-            <a:avLst/>
-          </a:prstGeom>
-          <a:solidFill>
-            <a:schemeClr val="accent2">
-              <a:lumMod val="40000"/>
-              <a:lumOff val="60000"/>
-            </a:schemeClr>
-          </a:solidFill>
-          <a:ln w="25400">
-            <a:solidFill>
-              <a:srgbClr val="C00000"/>
-            </a:solidFill>
-          </a:ln>
-        </p:spPr>
-        <p:txBody>
-          <a:bodyPr wrap="square" rtlCol="0">
-            <a:spAutoFit/>
-          </a:bodyPr>
-          <a:lstStyle/>
-          <a:p>
-            <a:pPr algn="ctr"/>
-            <a:r>
-              <a:rPr lang="en-US" b="1" dirty="0">
-                <a:solidFill>
-                  <a:srgbClr val="C00000"/>
-                </a:solidFill>
-              </a:rPr>
-              <a:t>13</a:t>
-            </a:r>
-          </a:p>
-        </p:txBody>
-      </p:sp>
-      <p:sp>
-        <p:nvSpPr>
-          <p:cNvPr id="97" name="TextBox 96">
-            <a:extLst>
-              <a:ext uri="{FF2B5EF4-FFF2-40B4-BE49-F238E27FC236}">
-                <a16:creationId xmlns:a16="http://schemas.microsoft.com/office/drawing/2014/main" id="{E713F805-3CF5-684C-81FB-5D5321772451}"/>
-              </a:ext>
-            </a:extLst>
-          </p:cNvPr>
-          <p:cNvSpPr txBox="1"/>
-          <p:nvPr/>
-        </p:nvSpPr>
-        <p:spPr>
-          <a:xfrm>
-            <a:off x="10692935" y="4898507"/>
+            <a:off x="10991608" y="2798189"/>
             <a:ext cx="481986" cy="369332"/>
           </a:xfrm>
           <a:prstGeom prst="rect">
@@ -6726,60 +6471,6 @@
                   </a:schemeClr>
                 </a:solidFill>
               </a:rPr>
-              <a:t>14</a:t>
-            </a:r>
-          </a:p>
-        </p:txBody>
-      </p:sp>
-      <p:sp>
-        <p:nvSpPr>
-          <p:cNvPr id="98" name="TextBox 97">
-            <a:extLst>
-              <a:ext uri="{FF2B5EF4-FFF2-40B4-BE49-F238E27FC236}">
-                <a16:creationId xmlns:a16="http://schemas.microsoft.com/office/drawing/2014/main" id="{4E29A9A4-6A48-9348-AF91-21BA80C6C07B}"/>
-              </a:ext>
-            </a:extLst>
-          </p:cNvPr>
-          <p:cNvSpPr txBox="1"/>
-          <p:nvPr/>
-        </p:nvSpPr>
-        <p:spPr>
-          <a:xfrm>
-            <a:off x="10991608" y="2798189"/>
-            <a:ext cx="481986" cy="369332"/>
-          </a:xfrm>
-          <a:prstGeom prst="rect">
-            <a:avLst/>
-          </a:prstGeom>
-          <a:solidFill>
-            <a:schemeClr val="accent4">
-              <a:lumMod val="40000"/>
-              <a:lumOff val="60000"/>
-            </a:schemeClr>
-          </a:solidFill>
-          <a:ln w="25400">
-            <a:solidFill>
-              <a:schemeClr val="accent4">
-                <a:lumMod val="75000"/>
-              </a:schemeClr>
-            </a:solidFill>
-          </a:ln>
-        </p:spPr>
-        <p:txBody>
-          <a:bodyPr wrap="square" rtlCol="0">
-            <a:spAutoFit/>
-          </a:bodyPr>
-          <a:lstStyle/>
-          <a:p>
-            <a:pPr algn="ctr"/>
-            <a:r>
-              <a:rPr lang="en-US" b="1" dirty="0">
-                <a:solidFill>
-                  <a:schemeClr val="accent4">
-                    <a:lumMod val="75000"/>
-                  </a:schemeClr>
-                </a:solidFill>
-              </a:rPr>
               <a:t>15</a:t>
             </a:r>
           </a:p>
@@ -6881,60 +6572,6 @@
                 </a:solidFill>
               </a:rPr>
               <a:t>5</a:t>
-            </a:r>
-          </a:p>
-        </p:txBody>
-      </p:sp>
-      <p:sp>
-        <p:nvSpPr>
-          <p:cNvPr id="104" name="TextBox 103">
-            <a:extLst>
-              <a:ext uri="{FF2B5EF4-FFF2-40B4-BE49-F238E27FC236}">
-                <a16:creationId xmlns:a16="http://schemas.microsoft.com/office/drawing/2014/main" id="{8FF9DF29-8FC9-A74D-A896-3FC80ADACA58}"/>
-              </a:ext>
-            </a:extLst>
-          </p:cNvPr>
-          <p:cNvSpPr txBox="1"/>
-          <p:nvPr/>
-        </p:nvSpPr>
-        <p:spPr>
-          <a:xfrm>
-            <a:off x="6321020" y="3118068"/>
-            <a:ext cx="457490" cy="369332"/>
-          </a:xfrm>
-          <a:prstGeom prst="rect">
-            <a:avLst/>
-          </a:prstGeom>
-          <a:solidFill>
-            <a:schemeClr val="accent4">
-              <a:lumMod val="40000"/>
-              <a:lumOff val="60000"/>
-            </a:schemeClr>
-          </a:solidFill>
-          <a:ln w="25400">
-            <a:solidFill>
-              <a:schemeClr val="accent4">
-                <a:lumMod val="75000"/>
-              </a:schemeClr>
-            </a:solidFill>
-          </a:ln>
-        </p:spPr>
-        <p:txBody>
-          <a:bodyPr wrap="square" rtlCol="0">
-            <a:spAutoFit/>
-          </a:bodyPr>
-          <a:lstStyle/>
-          <a:p>
-            <a:pPr algn="ctr"/>
-            <a:r>
-              <a:rPr lang="en-US" b="1" dirty="0">
-                <a:solidFill>
-                  <a:schemeClr val="accent4">
-                    <a:lumMod val="75000"/>
-                  </a:schemeClr>
-                </a:solidFill>
-              </a:rPr>
-              <a:t>10</a:t>
             </a:r>
           </a:p>
         </p:txBody>
@@ -7886,6 +7523,332 @@
                 <a:sym typeface="Arial"/>
               </a:rPr>
               <a:t>Population</a:t>
+            </a:r>
+          </a:p>
+        </p:txBody>
+      </p:sp>
+      <p:cxnSp>
+        <p:nvCxnSpPr>
+          <p:cNvPr id="93" name="Straight Arrow Connector 129">
+            <a:extLst>
+              <a:ext uri="{FF2B5EF4-FFF2-40B4-BE49-F238E27FC236}">
+                <a16:creationId xmlns:a16="http://schemas.microsoft.com/office/drawing/2014/main" id="{7BD44C0A-863E-4D8C-8FF5-E48E77AE9EFC}"/>
+              </a:ext>
+            </a:extLst>
+          </p:cNvPr>
+          <p:cNvCxnSpPr>
+            <a:cxnSpLocks/>
+            <a:stCxn id="78" idx="2"/>
+          </p:cNvCxnSpPr>
+          <p:nvPr/>
+        </p:nvCxnSpPr>
+        <p:spPr>
+          <a:xfrm rot="5400000">
+            <a:off x="5727723" y="3837522"/>
+            <a:ext cx="2065570" cy="397866"/>
+          </a:xfrm>
+          <a:prstGeom prst="bentConnector3">
+            <a:avLst>
+              <a:gd name="adj1" fmla="val 50000"/>
+            </a:avLst>
+          </a:prstGeom>
+          <a:noFill/>
+          <a:ln w="25400" cap="flat" cmpd="sng" algn="ctr">
+            <a:solidFill>
+              <a:schemeClr val="accent4">
+                <a:lumMod val="75000"/>
+              </a:schemeClr>
+            </a:solidFill>
+            <a:prstDash val="dash"/>
+            <a:miter lim="800000"/>
+            <a:tailEnd type="triangle" w="lg" len="lg"/>
+          </a:ln>
+          <a:effectLst/>
+        </p:spPr>
+      </p:cxnSp>
+      <p:sp>
+        <p:nvSpPr>
+          <p:cNvPr id="104" name="TextBox 103">
+            <a:extLst>
+              <a:ext uri="{FF2B5EF4-FFF2-40B4-BE49-F238E27FC236}">
+                <a16:creationId xmlns:a16="http://schemas.microsoft.com/office/drawing/2014/main" id="{8FF9DF29-8FC9-A74D-A896-3FC80ADACA58}"/>
+              </a:ext>
+            </a:extLst>
+          </p:cNvPr>
+          <p:cNvSpPr txBox="1"/>
+          <p:nvPr/>
+        </p:nvSpPr>
+        <p:spPr>
+          <a:xfrm>
+            <a:off x="6719891" y="3282553"/>
+            <a:ext cx="457490" cy="369332"/>
+          </a:xfrm>
+          <a:prstGeom prst="rect">
+            <a:avLst/>
+          </a:prstGeom>
+          <a:solidFill>
+            <a:schemeClr val="accent4">
+              <a:lumMod val="40000"/>
+              <a:lumOff val="60000"/>
+            </a:schemeClr>
+          </a:solidFill>
+          <a:ln w="25400">
+            <a:solidFill>
+              <a:schemeClr val="accent4">
+                <a:lumMod val="75000"/>
+              </a:schemeClr>
+            </a:solidFill>
+          </a:ln>
+        </p:spPr>
+        <p:txBody>
+          <a:bodyPr wrap="square" rtlCol="0">
+            <a:spAutoFit/>
+          </a:bodyPr>
+          <a:lstStyle/>
+          <a:p>
+            <a:pPr algn="ctr"/>
+            <a:r>
+              <a:rPr lang="en-US" b="1" dirty="0">
+                <a:solidFill>
+                  <a:schemeClr val="accent4">
+                    <a:lumMod val="75000"/>
+                  </a:schemeClr>
+                </a:solidFill>
+              </a:rPr>
+              <a:t>10</a:t>
+            </a:r>
+          </a:p>
+        </p:txBody>
+      </p:sp>
+      <p:cxnSp>
+        <p:nvCxnSpPr>
+          <p:cNvPr id="100" name="Straight Arrow Connector 129">
+            <a:extLst>
+              <a:ext uri="{FF2B5EF4-FFF2-40B4-BE49-F238E27FC236}">
+                <a16:creationId xmlns:a16="http://schemas.microsoft.com/office/drawing/2014/main" id="{DF79BE50-8645-45B8-9D27-56623488135F}"/>
+              </a:ext>
+            </a:extLst>
+          </p:cNvPr>
+          <p:cNvCxnSpPr>
+            <a:cxnSpLocks/>
+            <a:stCxn id="76" idx="2"/>
+          </p:cNvCxnSpPr>
+          <p:nvPr/>
+        </p:nvCxnSpPr>
+        <p:spPr>
+          <a:xfrm rot="16200000" flipH="1">
+            <a:off x="4260500" y="3777941"/>
+            <a:ext cx="2085801" cy="537258"/>
+          </a:xfrm>
+          <a:prstGeom prst="bentConnector3">
+            <a:avLst>
+              <a:gd name="adj1" fmla="val 50000"/>
+            </a:avLst>
+          </a:prstGeom>
+          <a:noFill/>
+          <a:ln w="25400" cap="flat" cmpd="sng" algn="ctr">
+            <a:solidFill>
+              <a:schemeClr val="accent4">
+                <a:lumMod val="75000"/>
+              </a:schemeClr>
+            </a:solidFill>
+            <a:prstDash val="dash"/>
+            <a:miter lim="800000"/>
+            <a:tailEnd type="triangle" w="lg" len="lg"/>
+          </a:ln>
+          <a:effectLst/>
+        </p:spPr>
+      </p:cxnSp>
+      <p:sp>
+        <p:nvSpPr>
+          <p:cNvPr id="90" name="TextBox 89">
+            <a:extLst>
+              <a:ext uri="{FF2B5EF4-FFF2-40B4-BE49-F238E27FC236}">
+                <a16:creationId xmlns:a16="http://schemas.microsoft.com/office/drawing/2014/main" id="{F72EDA13-3023-F544-9568-8433B3292E59}"/>
+              </a:ext>
+            </a:extLst>
+          </p:cNvPr>
+          <p:cNvSpPr txBox="1"/>
+          <p:nvPr/>
+        </p:nvSpPr>
+        <p:spPr>
+          <a:xfrm>
+            <a:off x="4886181" y="3270230"/>
+            <a:ext cx="297180" cy="369332"/>
+          </a:xfrm>
+          <a:prstGeom prst="rect">
+            <a:avLst/>
+          </a:prstGeom>
+          <a:solidFill>
+            <a:schemeClr val="accent4">
+              <a:lumMod val="40000"/>
+              <a:lumOff val="60000"/>
+            </a:schemeClr>
+          </a:solidFill>
+          <a:ln w="25400">
+            <a:solidFill>
+              <a:schemeClr val="accent4">
+                <a:lumMod val="75000"/>
+              </a:schemeClr>
+            </a:solidFill>
+          </a:ln>
+        </p:spPr>
+        <p:txBody>
+          <a:bodyPr wrap="square" rtlCol="0">
+            <a:spAutoFit/>
+          </a:bodyPr>
+          <a:lstStyle/>
+          <a:p>
+            <a:pPr algn="ctr"/>
+            <a:r>
+              <a:rPr lang="en-US" b="1" dirty="0">
+                <a:solidFill>
+                  <a:schemeClr val="accent4">
+                    <a:lumMod val="75000"/>
+                  </a:schemeClr>
+                </a:solidFill>
+              </a:rPr>
+              <a:t>8</a:t>
+            </a:r>
+          </a:p>
+        </p:txBody>
+      </p:sp>
+      <p:sp>
+        <p:nvSpPr>
+          <p:cNvPr id="107" name="TextBox 106">
+            <a:extLst>
+              <a:ext uri="{FF2B5EF4-FFF2-40B4-BE49-F238E27FC236}">
+                <a16:creationId xmlns:a16="http://schemas.microsoft.com/office/drawing/2014/main" id="{3218D5BB-EB76-46E2-93B4-9E1CD3B5EBDF}"/>
+              </a:ext>
+            </a:extLst>
+          </p:cNvPr>
+          <p:cNvSpPr txBox="1"/>
+          <p:nvPr/>
+        </p:nvSpPr>
+        <p:spPr>
+          <a:xfrm>
+            <a:off x="4296904" y="4095181"/>
+            <a:ext cx="1254197" cy="523220"/>
+          </a:xfrm>
+          <a:prstGeom prst="rect">
+            <a:avLst/>
+          </a:prstGeom>
+          <a:noFill/>
+        </p:spPr>
+        <p:txBody>
+          <a:bodyPr wrap="square" rtlCol="0">
+            <a:spAutoFit/>
+          </a:bodyPr>
+          <a:lstStyle/>
+          <a:p>
+            <a:pPr algn="r"/>
+            <a:r>
+              <a:rPr lang="en-US" sz="1400" b="1" dirty="0">
+                <a:solidFill>
+                  <a:schemeClr val="accent1"/>
+                </a:solidFill>
+              </a:rPr>
+              <a:t>Runoff by Basin</a:t>
+            </a:r>
+          </a:p>
+        </p:txBody>
+      </p:sp>
+      <p:sp>
+        <p:nvSpPr>
+          <p:cNvPr id="108" name="TextBox 107">
+            <a:extLst>
+              <a:ext uri="{FF2B5EF4-FFF2-40B4-BE49-F238E27FC236}">
+                <a16:creationId xmlns:a16="http://schemas.microsoft.com/office/drawing/2014/main" id="{C3C50344-8FCA-4773-B9F5-3FB195D364AB}"/>
+              </a:ext>
+            </a:extLst>
+          </p:cNvPr>
+          <p:cNvSpPr txBox="1"/>
+          <p:nvPr/>
+        </p:nvSpPr>
+        <p:spPr>
+          <a:xfrm>
+            <a:off x="5556928" y="3692019"/>
+            <a:ext cx="919721" cy="523220"/>
+          </a:xfrm>
+          <a:prstGeom prst="rect">
+            <a:avLst/>
+          </a:prstGeom>
+          <a:noFill/>
+        </p:spPr>
+        <p:txBody>
+          <a:bodyPr wrap="square" rtlCol="0">
+            <a:spAutoFit/>
+          </a:bodyPr>
+          <a:lstStyle/>
+          <a:p>
+            <a:pPr algn="ctr"/>
+            <a:r>
+              <a:rPr lang="en-US" sz="1400" b="1" dirty="0">
+                <a:solidFill>
+                  <a:schemeClr val="accent1"/>
+                </a:solidFill>
+              </a:rPr>
+              <a:t>HDD/CDD </a:t>
+            </a:r>
+          </a:p>
+          <a:p>
+            <a:pPr algn="ctr"/>
+            <a:r>
+              <a:rPr lang="en-US" sz="1400" b="1" dirty="0">
+                <a:solidFill>
+                  <a:schemeClr val="accent1"/>
+                </a:solidFill>
+              </a:rPr>
+              <a:t>by State</a:t>
+            </a:r>
+          </a:p>
+        </p:txBody>
+      </p:sp>
+      <p:sp>
+        <p:nvSpPr>
+          <p:cNvPr id="110" name="TextBox 109">
+            <a:extLst>
+              <a:ext uri="{FF2B5EF4-FFF2-40B4-BE49-F238E27FC236}">
+                <a16:creationId xmlns:a16="http://schemas.microsoft.com/office/drawing/2014/main" id="{F3216295-03FA-4A2C-AE62-DB57451FF6C1}"/>
+              </a:ext>
+            </a:extLst>
+          </p:cNvPr>
+          <p:cNvSpPr txBox="1"/>
+          <p:nvPr/>
+        </p:nvSpPr>
+        <p:spPr>
+          <a:xfrm>
+            <a:off x="6544079" y="4054962"/>
+            <a:ext cx="1254197" cy="523220"/>
+          </a:xfrm>
+          <a:prstGeom prst="rect">
+            <a:avLst/>
+          </a:prstGeom>
+          <a:noFill/>
+        </p:spPr>
+        <p:txBody>
+          <a:bodyPr wrap="square" rtlCol="0">
+            <a:spAutoFit/>
+          </a:bodyPr>
+          <a:lstStyle/>
+          <a:p>
+            <a:r>
+              <a:rPr lang="en-US" sz="1400" b="1" dirty="0">
+                <a:solidFill>
+                  <a:schemeClr val="accent1"/>
+                </a:solidFill>
+              </a:rPr>
+              <a:t>Ag Yields</a:t>
+            </a:r>
+          </a:p>
+          <a:p>
+            <a:r>
+              <a:rPr lang="en-US" sz="1400" b="1" dirty="0">
+                <a:solidFill>
+                  <a:schemeClr val="accent1"/>
+                </a:solidFill>
+              </a:rPr>
+              <a:t>By Basin</a:t>
             </a:r>
           </a:p>
         </p:txBody>

</xml_diff>

<commit_message>
Minor tweaks to wiring diagram
</commit_message>
<xml_diff>
--- a/experiment_diagram/experiment-B-N6_interconnect.pptx
+++ b/experiment_diagram/experiment-B-N6_interconnect.pptx
@@ -816,7 +816,7 @@
           <a:p>
             <a:fld id="{50E52EA3-2204-804F-9678-85900D481E2E}" type="datetimeFigureOut">
               <a:rPr lang="en-US" smtClean="0"/>
-              <a:t>5/2/2022</a:t>
+              <a:t>5/2/22</a:t>
             </a:fld>
             <a:endParaRPr lang="en-US"/>
           </a:p>
@@ -1014,7 +1014,7 @@
           <a:p>
             <a:fld id="{50E52EA3-2204-804F-9678-85900D481E2E}" type="datetimeFigureOut">
               <a:rPr lang="en-US" smtClean="0"/>
-              <a:t>5/2/2022</a:t>
+              <a:t>5/2/22</a:t>
             </a:fld>
             <a:endParaRPr lang="en-US"/>
           </a:p>
@@ -1222,7 +1222,7 @@
           <a:p>
             <a:fld id="{50E52EA3-2204-804F-9678-85900D481E2E}" type="datetimeFigureOut">
               <a:rPr lang="en-US" smtClean="0"/>
-              <a:t>5/2/2022</a:t>
+              <a:t>5/2/22</a:t>
             </a:fld>
             <a:endParaRPr lang="en-US"/>
           </a:p>
@@ -1420,7 +1420,7 @@
           <a:p>
             <a:fld id="{50E52EA3-2204-804F-9678-85900D481E2E}" type="datetimeFigureOut">
               <a:rPr lang="en-US" smtClean="0"/>
-              <a:t>5/2/2022</a:t>
+              <a:t>5/2/22</a:t>
             </a:fld>
             <a:endParaRPr lang="en-US"/>
           </a:p>
@@ -1695,7 +1695,7 @@
           <a:p>
             <a:fld id="{50E52EA3-2204-804F-9678-85900D481E2E}" type="datetimeFigureOut">
               <a:rPr lang="en-US" smtClean="0"/>
-              <a:t>5/2/2022</a:t>
+              <a:t>5/2/22</a:t>
             </a:fld>
             <a:endParaRPr lang="en-US"/>
           </a:p>
@@ -1960,7 +1960,7 @@
           <a:p>
             <a:fld id="{50E52EA3-2204-804F-9678-85900D481E2E}" type="datetimeFigureOut">
               <a:rPr lang="en-US" smtClean="0"/>
-              <a:t>5/2/2022</a:t>
+              <a:t>5/2/22</a:t>
             </a:fld>
             <a:endParaRPr lang="en-US"/>
           </a:p>
@@ -2372,7 +2372,7 @@
           <a:p>
             <a:fld id="{50E52EA3-2204-804F-9678-85900D481E2E}" type="datetimeFigureOut">
               <a:rPr lang="en-US" smtClean="0"/>
-              <a:t>5/2/2022</a:t>
+              <a:t>5/2/22</a:t>
             </a:fld>
             <a:endParaRPr lang="en-US"/>
           </a:p>
@@ -2513,7 +2513,7 @@
           <a:p>
             <a:fld id="{50E52EA3-2204-804F-9678-85900D481E2E}" type="datetimeFigureOut">
               <a:rPr lang="en-US" smtClean="0"/>
-              <a:t>5/2/2022</a:t>
+              <a:t>5/2/22</a:t>
             </a:fld>
             <a:endParaRPr lang="en-US"/>
           </a:p>
@@ -2626,7 +2626,7 @@
           <a:p>
             <a:fld id="{50E52EA3-2204-804F-9678-85900D481E2E}" type="datetimeFigureOut">
               <a:rPr lang="en-US" smtClean="0"/>
-              <a:t>5/2/2022</a:t>
+              <a:t>5/2/22</a:t>
             </a:fld>
             <a:endParaRPr lang="en-US"/>
           </a:p>
@@ -2937,7 +2937,7 @@
           <a:p>
             <a:fld id="{50E52EA3-2204-804F-9678-85900D481E2E}" type="datetimeFigureOut">
               <a:rPr lang="en-US" smtClean="0"/>
-              <a:t>5/2/2022</a:t>
+              <a:t>5/2/22</a:t>
             </a:fld>
             <a:endParaRPr lang="en-US"/>
           </a:p>
@@ -3225,7 +3225,7 @@
           <a:p>
             <a:fld id="{50E52EA3-2204-804F-9678-85900D481E2E}" type="datetimeFigureOut">
               <a:rPr lang="en-US" smtClean="0"/>
-              <a:t>5/2/2022</a:t>
+              <a:t>5/2/22</a:t>
             </a:fld>
             <a:endParaRPr lang="en-US"/>
           </a:p>
@@ -3466,7 +3466,7 @@
           <a:p>
             <a:fld id="{50E52EA3-2204-804F-9678-85900D481E2E}" type="datetimeFigureOut">
               <a:rPr lang="en-US" smtClean="0"/>
-              <a:t>5/2/2022</a:t>
+              <a:t>5/2/22</a:t>
             </a:fld>
             <a:endParaRPr lang="en-US"/>
           </a:p>
@@ -4637,8 +4637,8 @@
         </p:nvSpPr>
         <p:spPr>
           <a:xfrm>
-            <a:off x="7425486" y="3261178"/>
-            <a:ext cx="2180304" cy="523220"/>
+            <a:off x="7845623" y="3475364"/>
+            <a:ext cx="1741398" cy="523220"/>
           </a:xfrm>
           <a:prstGeom prst="rect">
             <a:avLst/>
@@ -4651,7 +4651,6 @@
           </a:bodyPr>
           <a:lstStyle/>
           <a:p>
-            <a:pPr algn="ctr"/>
             <a:r>
               <a:rPr lang="en-US" sz="1400" b="1" dirty="0">
                 <a:solidFill>
@@ -4716,8 +4715,8 @@
         </p:nvSpPr>
         <p:spPr>
           <a:xfrm>
-            <a:off x="7635157" y="4316572"/>
-            <a:ext cx="1254197" cy="738664"/>
+            <a:off x="8305710" y="4189065"/>
+            <a:ext cx="1232255" cy="738664"/>
           </a:xfrm>
           <a:prstGeom prst="rect">
             <a:avLst/>
@@ -4730,25 +4729,13 @@
           </a:bodyPr>
           <a:lstStyle/>
           <a:p>
-            <a:pPr algn="r"/>
             <a:r>
               <a:rPr lang="en-US" sz="1400" b="1" dirty="0">
                 <a:solidFill>
                   <a:schemeClr val="accent1"/>
                 </a:solidFill>
               </a:rPr>
-              <a:t>Fuel prices and generator </a:t>
-            </a:r>
-          </a:p>
-          <a:p>
-            <a:pPr algn="r"/>
-            <a:r>
-              <a:rPr lang="en-US" sz="1400" b="1" dirty="0">
-                <a:solidFill>
-                  <a:schemeClr val="accent1"/>
-                </a:solidFill>
-              </a:rPr>
-              <a:t>variable costs</a:t>
+              <a:t>Fuel prices and generator variable costs</a:t>
             </a:r>
           </a:p>
         </p:txBody>
@@ -5192,14 +5179,12 @@
           </p:cNvPr>
           <p:cNvCxnSpPr>
             <a:cxnSpLocks/>
-            <a:stCxn id="77" idx="2"/>
-            <a:endCxn id="24" idx="0"/>
           </p:cNvCxnSpPr>
           <p:nvPr/>
         </p:nvCxnSpPr>
         <p:spPr>
           <a:xfrm>
-            <a:off x="5997106" y="3003670"/>
+            <a:off x="6069934" y="3003670"/>
             <a:ext cx="0" cy="2085801"/>
           </a:xfrm>
           <a:prstGeom prst="straightConnector1">
@@ -6170,7 +6155,7 @@
         </p:nvSpPr>
         <p:spPr>
           <a:xfrm>
-            <a:off x="5834702" y="3286469"/>
+            <a:off x="5907530" y="3286469"/>
             <a:ext cx="297180" cy="369332"/>
           </a:xfrm>
           <a:prstGeom prst="rect">
@@ -6278,7 +6263,7 @@
         </p:nvSpPr>
         <p:spPr>
           <a:xfrm>
-            <a:off x="7320563" y="3522849"/>
+            <a:off x="7369991" y="3552308"/>
             <a:ext cx="481986" cy="369332"/>
           </a:xfrm>
           <a:prstGeom prst="rect">
@@ -6332,7 +6317,7 @@
         </p:nvSpPr>
         <p:spPr>
           <a:xfrm>
-            <a:off x="8994280" y="4040918"/>
+            <a:off x="9471708" y="4040918"/>
             <a:ext cx="481986" cy="369332"/>
           </a:xfrm>
           <a:prstGeom prst="rect">
@@ -6578,10 +6563,10 @@
       </p:sp>
       <p:sp>
         <p:nvSpPr>
-          <p:cNvPr id="76" name="Rounded Rectangle 75">
-            <a:extLst>
-              <a:ext uri="{FF2B5EF4-FFF2-40B4-BE49-F238E27FC236}">
-                <a16:creationId xmlns:a16="http://schemas.microsoft.com/office/drawing/2014/main" id="{A5AEB2BB-4E50-5D4C-A78A-F7021C22F135}"/>
+          <p:cNvPr id="12" name="Rounded Rectangle 11">
+            <a:extLst>
+              <a:ext uri="{FF2B5EF4-FFF2-40B4-BE49-F238E27FC236}">
+                <a16:creationId xmlns:a16="http://schemas.microsoft.com/office/drawing/2014/main" id="{F0116956-FCCD-0748-BCB3-ABD6C0D6A895}"/>
               </a:ext>
             </a:extLst>
           </p:cNvPr>
@@ -6590,8 +6575,8 @@
         </p:nvSpPr>
         <p:spPr>
           <a:xfrm>
-            <a:off x="4577571" y="2259470"/>
-            <a:ext cx="914400" cy="744200"/>
+            <a:off x="10221601" y="3814394"/>
+            <a:ext cx="1427830" cy="824359"/>
           </a:xfrm>
           <a:prstGeom prst="roundRect">
             <a:avLst/>
@@ -6634,7 +6619,7 @@
               <a:defRPr/>
             </a:pPr>
             <a:r>
-              <a:rPr kumimoji="0" lang="en-US" sz="1200" b="0" i="0" u="none" strike="noStrike" kern="0" cap="none" spc="0" normalizeH="0" baseline="0" noProof="0" dirty="0">
+              <a:rPr kumimoji="0" lang="en-US" sz="1400" b="0" i="0" u="none" strike="noStrike" kern="0" cap="none" spc="0" normalizeH="0" baseline="0" noProof="0" dirty="0">
                 <a:ln>
                   <a:noFill/>
                 </a:ln>
@@ -6649,7 +6634,7 @@
                 <a:cs typeface="+mn-cs"/>
                 <a:sym typeface="Arial"/>
               </a:rPr>
-              <a:t>Water Runoff</a:t>
+              <a:t>Electric Grid Operations</a:t>
             </a:r>
           </a:p>
           <a:p>
@@ -6673,7 +6658,7 @@
               <a:defRPr/>
             </a:pPr>
             <a:r>
-              <a:rPr kumimoji="0" lang="en-US" sz="900" b="0" i="0" u="none" strike="noStrike" kern="0" cap="none" spc="0" normalizeH="0" baseline="0" noProof="0" dirty="0">
+              <a:rPr kumimoji="0" lang="en-US" sz="1400" b="0" i="0" u="none" strike="noStrike" kern="0" cap="none" spc="0" normalizeH="0" baseline="0" noProof="0" dirty="0">
                 <a:ln>
                   <a:noFill/>
                 </a:ln>
@@ -6688,17 +6673,45 @@
                 <a:cs typeface="+mn-cs"/>
                 <a:sym typeface="Arial"/>
               </a:rPr>
-              <a:t>(Xanthos)</a:t>
-            </a:r>
-          </a:p>
-        </p:txBody>
-      </p:sp>
-      <p:sp>
-        <p:nvSpPr>
-          <p:cNvPr id="77" name="Rounded Rectangle 76">
-            <a:extLst>
-              <a:ext uri="{FF2B5EF4-FFF2-40B4-BE49-F238E27FC236}">
-                <a16:creationId xmlns:a16="http://schemas.microsoft.com/office/drawing/2014/main" id="{9AB0B74A-828D-9548-B981-A52F96E3244E}"/>
+              <a:t>(</a:t>
+            </a:r>
+            <a:r>
+              <a:rPr lang="en-US" sz="1400" kern="0" dirty="0">
+                <a:solidFill>
+                  <a:srgbClr val="FFFFFF"/>
+                </a:solidFill>
+                <a:latin typeface="Calibri" panose="020F0502020204030204"/>
+                <a:sym typeface="Arial"/>
+              </a:rPr>
+              <a:t>GO</a:t>
+            </a:r>
+            <a:r>
+              <a:rPr kumimoji="0" lang="en-US" sz="1400" b="0" i="0" u="none" strike="noStrike" kern="0" cap="none" spc="0" normalizeH="0" baseline="0" noProof="0" dirty="0">
+                <a:ln>
+                  <a:noFill/>
+                </a:ln>
+                <a:solidFill>
+                  <a:srgbClr val="FFFFFF"/>
+                </a:solidFill>
+                <a:effectLst/>
+                <a:uLnTx/>
+                <a:uFillTx/>
+                <a:latin typeface="Calibri" panose="020F0502020204030204"/>
+                <a:ea typeface="+mn-ea"/>
+                <a:cs typeface="+mn-cs"/>
+                <a:sym typeface="Arial"/>
+              </a:rPr>
+              <a:t>)</a:t>
+            </a:r>
+          </a:p>
+        </p:txBody>
+      </p:sp>
+      <p:sp>
+        <p:nvSpPr>
+          <p:cNvPr id="24" name="Rounded Rectangle 23">
+            <a:extLst>
+              <a:ext uri="{FF2B5EF4-FFF2-40B4-BE49-F238E27FC236}">
+                <a16:creationId xmlns:a16="http://schemas.microsoft.com/office/drawing/2014/main" id="{1D075DFC-86C8-F549-9F4F-5BAF7DAC4516}"/>
               </a:ext>
             </a:extLst>
           </p:cNvPr>
@@ -6707,8 +6720,8 @@
         </p:nvSpPr>
         <p:spPr>
           <a:xfrm>
-            <a:off x="5539906" y="2259470"/>
-            <a:ext cx="914400" cy="744200"/>
+            <a:off x="5434323" y="5089471"/>
+            <a:ext cx="1382139" cy="744200"/>
           </a:xfrm>
           <a:prstGeom prst="roundRect">
             <a:avLst/>
@@ -6751,7 +6764,7 @@
               <a:defRPr/>
             </a:pPr>
             <a:r>
-              <a:rPr kumimoji="0" lang="en-US" sz="1200" b="0" i="0" u="none" strike="noStrike" kern="0" cap="none" spc="0" normalizeH="0" baseline="0" noProof="0" dirty="0">
+              <a:rPr kumimoji="0" lang="en-US" sz="1400" b="0" i="0" u="none" strike="noStrike" kern="0" cap="none" spc="0" normalizeH="0" baseline="0" noProof="0" dirty="0">
                 <a:ln>
                   <a:noFill/>
                 </a:ln>
@@ -6766,7 +6779,7 @@
                 <a:cs typeface="+mn-cs"/>
                 <a:sym typeface="Arial"/>
               </a:rPr>
-              <a:t>HDH/CDH</a:t>
+              <a:t>Energy, Water, Land Markets</a:t>
             </a:r>
           </a:p>
           <a:p>
@@ -6790,7 +6803,7 @@
               <a:defRPr/>
             </a:pPr>
             <a:r>
-              <a:rPr kumimoji="0" lang="en-US" sz="900" b="0" i="0" u="none" strike="noStrike" kern="0" cap="none" spc="0" normalizeH="0" baseline="0" noProof="0" dirty="0">
+              <a:rPr kumimoji="0" lang="en-US" sz="1400" b="0" i="0" u="none" strike="noStrike" kern="0" cap="none" spc="0" normalizeH="0" baseline="0" noProof="0" dirty="0">
                 <a:ln>
                   <a:noFill/>
                 </a:ln>
@@ -6805,17 +6818,17 @@
                 <a:cs typeface="+mn-cs"/>
                 <a:sym typeface="Arial"/>
               </a:rPr>
-              <a:t>(Helios)</a:t>
-            </a:r>
-          </a:p>
-        </p:txBody>
-      </p:sp>
-      <p:sp>
-        <p:nvSpPr>
-          <p:cNvPr id="78" name="Rounded Rectangle 77">
-            <a:extLst>
-              <a:ext uri="{FF2B5EF4-FFF2-40B4-BE49-F238E27FC236}">
-                <a16:creationId xmlns:a16="http://schemas.microsoft.com/office/drawing/2014/main" id="{2213A539-FE75-2E49-97A2-21078ECCB86B}"/>
+              <a:t>(GCAM-USA)</a:t>
+            </a:r>
+          </a:p>
+        </p:txBody>
+      </p:sp>
+      <p:sp>
+        <p:nvSpPr>
+          <p:cNvPr id="36" name="Rounded Rectangle 35">
+            <a:extLst>
+              <a:ext uri="{FF2B5EF4-FFF2-40B4-BE49-F238E27FC236}">
+                <a16:creationId xmlns:a16="http://schemas.microsoft.com/office/drawing/2014/main" id="{BC28141A-8220-3B48-9D85-19C7DBB3D748}"/>
               </a:ext>
             </a:extLst>
           </p:cNvPr>
@@ -6824,8 +6837,8 @@
         </p:nvSpPr>
         <p:spPr>
           <a:xfrm>
-            <a:off x="6502241" y="2259470"/>
-            <a:ext cx="914400" cy="744200"/>
+            <a:off x="8739578" y="5049392"/>
+            <a:ext cx="1427831" cy="824359"/>
           </a:xfrm>
           <a:prstGeom prst="roundRect">
             <a:avLst/>
@@ -6868,7 +6881,7 @@
               <a:defRPr/>
             </a:pPr>
             <a:r>
-              <a:rPr kumimoji="0" lang="en-US" sz="1200" b="0" i="0" u="none" strike="noStrike" kern="0" cap="none" spc="0" normalizeH="0" baseline="0" noProof="0" dirty="0">
+              <a:rPr kumimoji="0" lang="en-US" sz="1400" b="0" i="0" u="none" strike="noStrike" kern="0" cap="none" spc="0" normalizeH="0" baseline="0" noProof="0" dirty="0">
                 <a:ln>
                   <a:noFill/>
                 </a:ln>
@@ -6883,9 +6896,48 @@
                 <a:cs typeface="+mn-cs"/>
                 <a:sym typeface="Arial"/>
               </a:rPr>
-              <a:t>Ag Yield</a:t>
-            </a:r>
-          </a:p>
+              <a:t>Total ELectricity Loads (TELL)</a:t>
+            </a:r>
+          </a:p>
+        </p:txBody>
+      </p:sp>
+      <p:sp>
+        <p:nvSpPr>
+          <p:cNvPr id="54" name="Rounded Rectangle 53">
+            <a:extLst>
+              <a:ext uri="{FF2B5EF4-FFF2-40B4-BE49-F238E27FC236}">
+                <a16:creationId xmlns:a16="http://schemas.microsoft.com/office/drawing/2014/main" id="{2496E921-A9F4-D645-8C0F-4915E0C64BAC}"/>
+              </a:ext>
+            </a:extLst>
+          </p:cNvPr>
+          <p:cNvSpPr/>
+          <p:nvPr/>
+        </p:nvSpPr>
+        <p:spPr>
+          <a:xfrm>
+            <a:off x="8532303" y="2301675"/>
+            <a:ext cx="1339059" cy="968555"/>
+          </a:xfrm>
+          <a:prstGeom prst="roundRect">
+            <a:avLst/>
+          </a:prstGeom>
+          <a:solidFill>
+            <a:schemeClr val="bg1">
+              <a:lumMod val="50000"/>
+            </a:schemeClr>
+          </a:solidFill>
+          <a:ln w="25400" cap="flat" cmpd="sng" algn="ctr">
+            <a:solidFill>
+              <a:schemeClr val="tx1"/>
+            </a:solidFill>
+            <a:prstDash val="solid"/>
+            <a:miter lim="800000"/>
+          </a:ln>
+          <a:effectLst/>
+        </p:spPr>
+        <p:txBody>
+          <a:bodyPr rtlCol="0" anchor="ctr"/>
+          <a:lstStyle/>
           <a:p>
             <a:pPr marL="0" marR="0" lvl="0" indent="0" algn="ctr" defTabSz="914400" eaLnBrk="1" fontAlgn="auto" latinLnBrk="0" hangingPunct="1">
               <a:lnSpc>
@@ -6907,55 +6959,24 @@
               <a:defRPr/>
             </a:pPr>
             <a:r>
-              <a:rPr lang="en-US" sz="900" kern="0" dirty="0">
+              <a:rPr kumimoji="0" lang="en-US" sz="1400" b="0" i="0" u="none" strike="noStrike" kern="0" cap="none" spc="0" normalizeH="0" baseline="0" noProof="0" dirty="0">
+                <a:ln>
+                  <a:noFill/>
+                </a:ln>
                 <a:solidFill>
                   <a:srgbClr val="FFFFFF"/>
                 </a:solidFill>
+                <a:effectLst/>
+                <a:uLnTx/>
+                <a:uFillTx/>
                 <a:latin typeface="Calibri" panose="020F0502020204030204"/>
+                <a:ea typeface="+mn-ea"/>
+                <a:cs typeface="+mn-cs"/>
                 <a:sym typeface="Arial"/>
               </a:rPr>
-              <a:t>(Osiris)</a:t>
-            </a:r>
-          </a:p>
-        </p:txBody>
-      </p:sp>
-      <p:sp>
-        <p:nvSpPr>
-          <p:cNvPr id="12" name="Rounded Rectangle 11">
-            <a:extLst>
-              <a:ext uri="{FF2B5EF4-FFF2-40B4-BE49-F238E27FC236}">
-                <a16:creationId xmlns:a16="http://schemas.microsoft.com/office/drawing/2014/main" id="{F0116956-FCCD-0748-BCB3-ABD6C0D6A895}"/>
-              </a:ext>
-            </a:extLst>
-          </p:cNvPr>
-          <p:cNvSpPr/>
-          <p:nvPr/>
-        </p:nvSpPr>
-        <p:spPr>
-          <a:xfrm>
-            <a:off x="10221601" y="3814394"/>
-            <a:ext cx="1427830" cy="824359"/>
-          </a:xfrm>
-          <a:prstGeom prst="roundRect">
-            <a:avLst/>
-          </a:prstGeom>
-          <a:solidFill>
-            <a:schemeClr val="bg1">
-              <a:lumMod val="50000"/>
-            </a:schemeClr>
-          </a:solidFill>
-          <a:ln w="25400" cap="flat" cmpd="sng" algn="ctr">
-            <a:solidFill>
-              <a:schemeClr val="tx1"/>
-            </a:solidFill>
-            <a:prstDash val="solid"/>
-            <a:miter lim="800000"/>
-          </a:ln>
-          <a:effectLst/>
-        </p:spPr>
-        <p:txBody>
-          <a:bodyPr rtlCol="0" anchor="ctr"/>
-          <a:lstStyle/>
+              <a:t>Power Plant Siting Feasibility</a:t>
+            </a:r>
+          </a:p>
           <a:p>
             <a:pPr marL="0" marR="0" lvl="0" indent="0" algn="ctr" defTabSz="914400" eaLnBrk="1" fontAlgn="auto" latinLnBrk="0" hangingPunct="1">
               <a:lnSpc>
@@ -6992,9 +7013,48 @@
                 <a:cs typeface="+mn-cs"/>
                 <a:sym typeface="Arial"/>
               </a:rPr>
-              <a:t>Electric Grid Operations</a:t>
-            </a:r>
-          </a:p>
+              <a:t>(CERF) </a:t>
+            </a:r>
+          </a:p>
+        </p:txBody>
+      </p:sp>
+      <p:sp>
+        <p:nvSpPr>
+          <p:cNvPr id="70" name="Rounded Rectangle 69">
+            <a:extLst>
+              <a:ext uri="{FF2B5EF4-FFF2-40B4-BE49-F238E27FC236}">
+                <a16:creationId xmlns:a16="http://schemas.microsoft.com/office/drawing/2014/main" id="{33144FA7-DB63-E44B-B5F6-03C886F88948}"/>
+              </a:ext>
+            </a:extLst>
+          </p:cNvPr>
+          <p:cNvSpPr/>
+          <p:nvPr/>
+        </p:nvSpPr>
+        <p:spPr>
+          <a:xfrm>
+            <a:off x="3630407" y="786870"/>
+            <a:ext cx="1332993" cy="856257"/>
+          </a:xfrm>
+          <a:prstGeom prst="roundRect">
+            <a:avLst/>
+          </a:prstGeom>
+          <a:solidFill>
+            <a:schemeClr val="bg1">
+              <a:lumMod val="50000"/>
+            </a:schemeClr>
+          </a:solidFill>
+          <a:ln w="25400" cap="flat" cmpd="sng" algn="ctr">
+            <a:solidFill>
+              <a:schemeClr val="tx1"/>
+            </a:solidFill>
+            <a:prstDash val="solid"/>
+            <a:miter lim="800000"/>
+          </a:ln>
+          <a:effectLst/>
+        </p:spPr>
+        <p:txBody>
+          <a:bodyPr rtlCol="0" anchor="ctr"/>
+          <a:lstStyle/>
           <a:p>
             <a:pPr marL="0" marR="0" lvl="0" indent="0" algn="ctr" defTabSz="914400" eaLnBrk="1" fontAlgn="auto" latinLnBrk="0" hangingPunct="1">
               <a:lnSpc>
@@ -7016,7 +7076,7 @@
               <a:defRPr/>
             </a:pPr>
             <a:r>
-              <a:rPr kumimoji="0" lang="en-US" sz="1400" b="0" i="0" u="none" strike="noStrike" kern="0" cap="none" spc="0" normalizeH="0" baseline="0" noProof="0" dirty="0">
+              <a:rPr kumimoji="0" lang="en-US" sz="1200" b="0" i="0" u="none" strike="noStrike" kern="0" cap="none" spc="0" normalizeH="0" baseline="0" noProof="0" dirty="0">
                 <a:ln>
                   <a:noFill/>
                 </a:ln>
@@ -7031,45 +7091,418 @@
                 <a:cs typeface="+mn-cs"/>
                 <a:sym typeface="Arial"/>
               </a:rPr>
-              <a:t>(</a:t>
-            </a:r>
+              <a:t>Thermodynamic Global Warming Simulations (WRF)</a:t>
+            </a:r>
+          </a:p>
+        </p:txBody>
+      </p:sp>
+      <p:sp>
+        <p:nvSpPr>
+          <p:cNvPr id="18" name="Rounded Rectangle 17">
+            <a:extLst>
+              <a:ext uri="{FF2B5EF4-FFF2-40B4-BE49-F238E27FC236}">
+                <a16:creationId xmlns:a16="http://schemas.microsoft.com/office/drawing/2014/main" id="{CB3773D0-064F-C840-942F-AED3E66D04EE}"/>
+              </a:ext>
+            </a:extLst>
+          </p:cNvPr>
+          <p:cNvSpPr/>
+          <p:nvPr/>
+        </p:nvSpPr>
+        <p:spPr>
+          <a:xfrm>
+            <a:off x="2715876" y="3799240"/>
+            <a:ext cx="1382139" cy="824359"/>
+          </a:xfrm>
+          <a:prstGeom prst="roundRect">
+            <a:avLst/>
+          </a:prstGeom>
+          <a:solidFill>
+            <a:schemeClr val="bg1">
+              <a:lumMod val="50000"/>
+            </a:schemeClr>
+          </a:solidFill>
+          <a:ln w="25400" cap="flat" cmpd="sng" algn="ctr">
+            <a:solidFill>
+              <a:schemeClr val="tx1"/>
+            </a:solidFill>
+            <a:prstDash val="solid"/>
+            <a:miter lim="800000"/>
+          </a:ln>
+          <a:effectLst/>
+        </p:spPr>
+        <p:txBody>
+          <a:bodyPr rtlCol="0" anchor="ctr"/>
+          <a:lstStyle/>
+          <a:p>
+            <a:pPr lvl="0" algn="ctr">
+              <a:buClr>
+                <a:srgbClr val="000000"/>
+              </a:buClr>
+              <a:defRPr/>
+            </a:pPr>
             <a:r>
               <a:rPr lang="en-US" sz="1400" kern="0" dirty="0">
                 <a:solidFill>
-                  <a:srgbClr val="FFFFFF"/>
+                  <a:schemeClr val="bg1"/>
                 </a:solidFill>
-                <a:latin typeface="Calibri" panose="020F0502020204030204"/>
                 <a:sym typeface="Arial"/>
               </a:rPr>
-              <a:t>GO</a:t>
-            </a:r>
-            <a:r>
-              <a:rPr kumimoji="0" lang="en-US" sz="1400" b="0" i="0" u="none" strike="noStrike" kern="0" cap="none" spc="0" normalizeH="0" baseline="0" noProof="0" dirty="0">
-                <a:ln>
-                  <a:noFill/>
-                </a:ln>
+              <a:t>Gridded</a:t>
+            </a:r>
+          </a:p>
+          <a:p>
+            <a:pPr lvl="0" algn="ctr">
+              <a:buClr>
+                <a:srgbClr val="000000"/>
+              </a:buClr>
+              <a:defRPr/>
+            </a:pPr>
+            <a:r>
+              <a:rPr lang="en-US" sz="1400" kern="0" dirty="0">
                 <a:solidFill>
-                  <a:srgbClr val="FFFFFF"/>
+                  <a:schemeClr val="bg1"/>
                 </a:solidFill>
-                <a:effectLst/>
-                <a:uLnTx/>
-                <a:uFillTx/>
-                <a:latin typeface="Calibri" panose="020F0502020204030204"/>
-                <a:ea typeface="+mn-ea"/>
-                <a:cs typeface="+mn-cs"/>
                 <a:sym typeface="Arial"/>
               </a:rPr>
-              <a:t>)</a:t>
-            </a:r>
-          </a:p>
-        </p:txBody>
-      </p:sp>
-      <p:sp>
-        <p:nvSpPr>
-          <p:cNvPr id="24" name="Rounded Rectangle 23">
-            <a:extLst>
-              <a:ext uri="{FF2B5EF4-FFF2-40B4-BE49-F238E27FC236}">
-                <a16:creationId xmlns:a16="http://schemas.microsoft.com/office/drawing/2014/main" id="{1D075DFC-86C8-F549-9F4F-5BAF7DAC4516}"/>
+              <a:t>Population</a:t>
+            </a:r>
+          </a:p>
+        </p:txBody>
+      </p:sp>
+      <p:cxnSp>
+        <p:nvCxnSpPr>
+          <p:cNvPr id="93" name="Straight Arrow Connector 129">
+            <a:extLst>
+              <a:ext uri="{FF2B5EF4-FFF2-40B4-BE49-F238E27FC236}">
+                <a16:creationId xmlns:a16="http://schemas.microsoft.com/office/drawing/2014/main" id="{7BD44C0A-863E-4D8C-8FF5-E48E77AE9EFC}"/>
+              </a:ext>
+            </a:extLst>
+          </p:cNvPr>
+          <p:cNvCxnSpPr>
+            <a:cxnSpLocks/>
+            <a:stCxn id="78" idx="2"/>
+          </p:cNvCxnSpPr>
+          <p:nvPr/>
+        </p:nvCxnSpPr>
+        <p:spPr>
+          <a:xfrm rot="5400000">
+            <a:off x="5727723" y="3837522"/>
+            <a:ext cx="2065570" cy="397866"/>
+          </a:xfrm>
+          <a:prstGeom prst="bentConnector3">
+            <a:avLst>
+              <a:gd name="adj1" fmla="val 50000"/>
+            </a:avLst>
+          </a:prstGeom>
+          <a:noFill/>
+          <a:ln w="25400" cap="flat" cmpd="sng" algn="ctr">
+            <a:solidFill>
+              <a:schemeClr val="accent4">
+                <a:lumMod val="75000"/>
+              </a:schemeClr>
+            </a:solidFill>
+            <a:prstDash val="dash"/>
+            <a:miter lim="800000"/>
+            <a:tailEnd type="triangle" w="lg" len="lg"/>
+          </a:ln>
+          <a:effectLst/>
+        </p:spPr>
+      </p:cxnSp>
+      <p:sp>
+        <p:nvSpPr>
+          <p:cNvPr id="104" name="TextBox 103">
+            <a:extLst>
+              <a:ext uri="{FF2B5EF4-FFF2-40B4-BE49-F238E27FC236}">
+                <a16:creationId xmlns:a16="http://schemas.microsoft.com/office/drawing/2014/main" id="{8FF9DF29-8FC9-A74D-A896-3FC80ADACA58}"/>
+              </a:ext>
+            </a:extLst>
+          </p:cNvPr>
+          <p:cNvSpPr txBox="1"/>
+          <p:nvPr/>
+        </p:nvSpPr>
+        <p:spPr>
+          <a:xfrm>
+            <a:off x="6719891" y="3282553"/>
+            <a:ext cx="457490" cy="369332"/>
+          </a:xfrm>
+          <a:prstGeom prst="rect">
+            <a:avLst/>
+          </a:prstGeom>
+          <a:solidFill>
+            <a:schemeClr val="accent4">
+              <a:lumMod val="40000"/>
+              <a:lumOff val="60000"/>
+            </a:schemeClr>
+          </a:solidFill>
+          <a:ln w="25400">
+            <a:solidFill>
+              <a:schemeClr val="accent4">
+                <a:lumMod val="75000"/>
+              </a:schemeClr>
+            </a:solidFill>
+          </a:ln>
+        </p:spPr>
+        <p:txBody>
+          <a:bodyPr wrap="square" rtlCol="0">
+            <a:spAutoFit/>
+          </a:bodyPr>
+          <a:lstStyle/>
+          <a:p>
+            <a:pPr algn="ctr"/>
+            <a:r>
+              <a:rPr lang="en-US" b="1" dirty="0">
+                <a:solidFill>
+                  <a:schemeClr val="accent4">
+                    <a:lumMod val="75000"/>
+                  </a:schemeClr>
+                </a:solidFill>
+              </a:rPr>
+              <a:t>10</a:t>
+            </a:r>
+          </a:p>
+        </p:txBody>
+      </p:sp>
+      <p:cxnSp>
+        <p:nvCxnSpPr>
+          <p:cNvPr id="100" name="Straight Arrow Connector 129">
+            <a:extLst>
+              <a:ext uri="{FF2B5EF4-FFF2-40B4-BE49-F238E27FC236}">
+                <a16:creationId xmlns:a16="http://schemas.microsoft.com/office/drawing/2014/main" id="{DF79BE50-8645-45B8-9D27-56623488135F}"/>
+              </a:ext>
+            </a:extLst>
+          </p:cNvPr>
+          <p:cNvCxnSpPr>
+            <a:cxnSpLocks/>
+            <a:stCxn id="76" idx="2"/>
+          </p:cNvCxnSpPr>
+          <p:nvPr/>
+        </p:nvCxnSpPr>
+        <p:spPr>
+          <a:xfrm rot="16200000" flipH="1">
+            <a:off x="4260500" y="3777941"/>
+            <a:ext cx="2085801" cy="537258"/>
+          </a:xfrm>
+          <a:prstGeom prst="bentConnector3">
+            <a:avLst>
+              <a:gd name="adj1" fmla="val 50000"/>
+            </a:avLst>
+          </a:prstGeom>
+          <a:noFill/>
+          <a:ln w="25400" cap="flat" cmpd="sng" algn="ctr">
+            <a:solidFill>
+              <a:schemeClr val="accent4">
+                <a:lumMod val="75000"/>
+              </a:schemeClr>
+            </a:solidFill>
+            <a:prstDash val="dash"/>
+            <a:miter lim="800000"/>
+            <a:tailEnd type="triangle" w="lg" len="lg"/>
+          </a:ln>
+          <a:effectLst/>
+        </p:spPr>
+      </p:cxnSp>
+      <p:sp>
+        <p:nvSpPr>
+          <p:cNvPr id="90" name="TextBox 89">
+            <a:extLst>
+              <a:ext uri="{FF2B5EF4-FFF2-40B4-BE49-F238E27FC236}">
+                <a16:creationId xmlns:a16="http://schemas.microsoft.com/office/drawing/2014/main" id="{F72EDA13-3023-F544-9568-8433B3292E59}"/>
+              </a:ext>
+            </a:extLst>
+          </p:cNvPr>
+          <p:cNvSpPr txBox="1"/>
+          <p:nvPr/>
+        </p:nvSpPr>
+        <p:spPr>
+          <a:xfrm>
+            <a:off x="4886181" y="3270230"/>
+            <a:ext cx="297180" cy="369332"/>
+          </a:xfrm>
+          <a:prstGeom prst="rect">
+            <a:avLst/>
+          </a:prstGeom>
+          <a:solidFill>
+            <a:schemeClr val="accent4">
+              <a:lumMod val="40000"/>
+              <a:lumOff val="60000"/>
+            </a:schemeClr>
+          </a:solidFill>
+          <a:ln w="25400">
+            <a:solidFill>
+              <a:schemeClr val="accent4">
+                <a:lumMod val="75000"/>
+              </a:schemeClr>
+            </a:solidFill>
+          </a:ln>
+        </p:spPr>
+        <p:txBody>
+          <a:bodyPr wrap="square" rtlCol="0">
+            <a:spAutoFit/>
+          </a:bodyPr>
+          <a:lstStyle/>
+          <a:p>
+            <a:pPr algn="ctr"/>
+            <a:r>
+              <a:rPr lang="en-US" b="1" dirty="0">
+                <a:solidFill>
+                  <a:schemeClr val="accent4">
+                    <a:lumMod val="75000"/>
+                  </a:schemeClr>
+                </a:solidFill>
+              </a:rPr>
+              <a:t>8</a:t>
+            </a:r>
+          </a:p>
+        </p:txBody>
+      </p:sp>
+      <p:sp>
+        <p:nvSpPr>
+          <p:cNvPr id="107" name="TextBox 106">
+            <a:extLst>
+              <a:ext uri="{FF2B5EF4-FFF2-40B4-BE49-F238E27FC236}">
+                <a16:creationId xmlns:a16="http://schemas.microsoft.com/office/drawing/2014/main" id="{3218D5BB-EB76-46E2-93B4-9E1CD3B5EBDF}"/>
+              </a:ext>
+            </a:extLst>
+          </p:cNvPr>
+          <p:cNvSpPr txBox="1"/>
+          <p:nvPr/>
+        </p:nvSpPr>
+        <p:spPr>
+          <a:xfrm>
+            <a:off x="4745665" y="4030686"/>
+            <a:ext cx="813528" cy="523220"/>
+          </a:xfrm>
+          <a:prstGeom prst="rect">
+            <a:avLst/>
+          </a:prstGeom>
+          <a:noFill/>
+        </p:spPr>
+        <p:txBody>
+          <a:bodyPr wrap="square" rtlCol="0">
+            <a:spAutoFit/>
+          </a:bodyPr>
+          <a:lstStyle/>
+          <a:p>
+            <a:pPr algn="r"/>
+            <a:r>
+              <a:rPr lang="en-US" sz="1400" b="1" dirty="0">
+                <a:solidFill>
+                  <a:schemeClr val="accent1"/>
+                </a:solidFill>
+              </a:rPr>
+              <a:t>Runoff by basin</a:t>
+            </a:r>
+          </a:p>
+        </p:txBody>
+      </p:sp>
+      <p:sp>
+        <p:nvSpPr>
+          <p:cNvPr id="108" name="TextBox 107">
+            <a:extLst>
+              <a:ext uri="{FF2B5EF4-FFF2-40B4-BE49-F238E27FC236}">
+                <a16:creationId xmlns:a16="http://schemas.microsoft.com/office/drawing/2014/main" id="{C3C50344-8FCA-4773-B9F5-3FB195D364AB}"/>
+              </a:ext>
+            </a:extLst>
+          </p:cNvPr>
+          <p:cNvSpPr txBox="1"/>
+          <p:nvPr/>
+        </p:nvSpPr>
+        <p:spPr>
+          <a:xfrm>
+            <a:off x="5597388" y="3691289"/>
+            <a:ext cx="936360" cy="523220"/>
+          </a:xfrm>
+          <a:prstGeom prst="rect">
+            <a:avLst/>
+          </a:prstGeom>
+          <a:solidFill>
+            <a:schemeClr val="bg1"/>
+          </a:solidFill>
+        </p:spPr>
+        <p:txBody>
+          <a:bodyPr wrap="square" rtlCol="0">
+            <a:spAutoFit/>
+          </a:bodyPr>
+          <a:lstStyle/>
+          <a:p>
+            <a:pPr algn="ctr"/>
+            <a:r>
+              <a:rPr lang="en-US" sz="1400" b="1" dirty="0">
+                <a:solidFill>
+                  <a:schemeClr val="accent1"/>
+                </a:solidFill>
+              </a:rPr>
+              <a:t>HDD/CDD </a:t>
+            </a:r>
+          </a:p>
+          <a:p>
+            <a:pPr algn="ctr"/>
+            <a:r>
+              <a:rPr lang="en-US" sz="1400" b="1" dirty="0">
+                <a:solidFill>
+                  <a:schemeClr val="accent1"/>
+                </a:solidFill>
+              </a:rPr>
+              <a:t>by state</a:t>
+            </a:r>
+          </a:p>
+        </p:txBody>
+      </p:sp>
+      <p:sp>
+        <p:nvSpPr>
+          <p:cNvPr id="110" name="TextBox 109">
+            <a:extLst>
+              <a:ext uri="{FF2B5EF4-FFF2-40B4-BE49-F238E27FC236}">
+                <a16:creationId xmlns:a16="http://schemas.microsoft.com/office/drawing/2014/main" id="{F3216295-03FA-4A2C-AE62-DB57451FF6C1}"/>
+              </a:ext>
+            </a:extLst>
+          </p:cNvPr>
+          <p:cNvSpPr txBox="1"/>
+          <p:nvPr/>
+        </p:nvSpPr>
+        <p:spPr>
+          <a:xfrm>
+            <a:off x="6552171" y="4030686"/>
+            <a:ext cx="881407" cy="523220"/>
+          </a:xfrm>
+          <a:prstGeom prst="rect">
+            <a:avLst/>
+          </a:prstGeom>
+          <a:noFill/>
+        </p:spPr>
+        <p:txBody>
+          <a:bodyPr wrap="square" rtlCol="0">
+            <a:spAutoFit/>
+          </a:bodyPr>
+          <a:lstStyle/>
+          <a:p>
+            <a:r>
+              <a:rPr lang="en-US" sz="1400" b="1" dirty="0">
+                <a:solidFill>
+                  <a:schemeClr val="accent1"/>
+                </a:solidFill>
+              </a:rPr>
+              <a:t>Ag yields</a:t>
+            </a:r>
+          </a:p>
+          <a:p>
+            <a:r>
+              <a:rPr lang="en-US" sz="1400" b="1" dirty="0">
+                <a:solidFill>
+                  <a:schemeClr val="accent1"/>
+                </a:solidFill>
+              </a:rPr>
+              <a:t>by basin</a:t>
+            </a:r>
+          </a:p>
+        </p:txBody>
+      </p:sp>
+      <p:sp>
+        <p:nvSpPr>
+          <p:cNvPr id="76" name="Rounded Rectangle 75">
+            <a:extLst>
+              <a:ext uri="{FF2B5EF4-FFF2-40B4-BE49-F238E27FC236}">
+                <a16:creationId xmlns:a16="http://schemas.microsoft.com/office/drawing/2014/main" id="{A5AEB2BB-4E50-5D4C-A78A-F7021C22F135}"/>
               </a:ext>
             </a:extLst>
           </p:cNvPr>
@@ -7078,8 +7511,8 @@
         </p:nvSpPr>
         <p:spPr>
           <a:xfrm>
-            <a:off x="5434323" y="5089471"/>
-            <a:ext cx="1382139" cy="744200"/>
+            <a:off x="4577571" y="2259470"/>
+            <a:ext cx="914400" cy="744200"/>
           </a:xfrm>
           <a:prstGeom prst="roundRect">
             <a:avLst/>
@@ -7137,7 +7570,7 @@
                 <a:cs typeface="+mn-cs"/>
                 <a:sym typeface="Arial"/>
               </a:rPr>
-              <a:t>Energy, Water, Land Markets</a:t>
+              <a:t>Water Runoff</a:t>
             </a:r>
           </a:p>
           <a:p>
@@ -7161,7 +7594,7 @@
               <a:defRPr/>
             </a:pPr>
             <a:r>
-              <a:rPr kumimoji="0" lang="en-US" sz="1400" b="0" i="0" u="none" strike="noStrike" kern="0" cap="none" spc="0" normalizeH="0" baseline="0" noProof="0" dirty="0">
+              <a:rPr kumimoji="0" lang="en-US" sz="1000" b="0" i="0" u="none" strike="noStrike" kern="0" cap="none" spc="0" normalizeH="0" baseline="0" noProof="0" dirty="0">
                 <a:ln>
                   <a:noFill/>
                 </a:ln>
@@ -7176,17 +7609,32 @@
                 <a:cs typeface="+mn-cs"/>
                 <a:sym typeface="Arial"/>
               </a:rPr>
-              <a:t>(GCAM-USA)</a:t>
-            </a:r>
-          </a:p>
-        </p:txBody>
-      </p:sp>
-      <p:sp>
-        <p:nvSpPr>
-          <p:cNvPr id="36" name="Rounded Rectangle 35">
-            <a:extLst>
-              <a:ext uri="{FF2B5EF4-FFF2-40B4-BE49-F238E27FC236}">
-                <a16:creationId xmlns:a16="http://schemas.microsoft.com/office/drawing/2014/main" id="{BC28141A-8220-3B48-9D85-19C7DBB3D748}"/>
+              <a:t>(Xanthos)</a:t>
+            </a:r>
+            <a:endParaRPr kumimoji="0" lang="en-US" sz="900" b="0" i="0" u="none" strike="noStrike" kern="0" cap="none" spc="0" normalizeH="0" baseline="0" noProof="0" dirty="0">
+              <a:ln>
+                <a:noFill/>
+              </a:ln>
+              <a:solidFill>
+                <a:srgbClr val="FFFFFF"/>
+              </a:solidFill>
+              <a:effectLst/>
+              <a:uLnTx/>
+              <a:uFillTx/>
+              <a:latin typeface="Calibri" panose="020F0502020204030204"/>
+              <a:ea typeface="+mn-ea"/>
+              <a:cs typeface="+mn-cs"/>
+              <a:sym typeface="Arial"/>
+            </a:endParaRPr>
+          </a:p>
+        </p:txBody>
+      </p:sp>
+      <p:sp>
+        <p:nvSpPr>
+          <p:cNvPr id="77" name="Rounded Rectangle 76">
+            <a:extLst>
+              <a:ext uri="{FF2B5EF4-FFF2-40B4-BE49-F238E27FC236}">
+                <a16:creationId xmlns:a16="http://schemas.microsoft.com/office/drawing/2014/main" id="{9AB0B74A-828D-9548-B981-A52F96E3244E}"/>
               </a:ext>
             </a:extLst>
           </p:cNvPr>
@@ -7195,8 +7643,8 @@
         </p:nvSpPr>
         <p:spPr>
           <a:xfrm>
-            <a:off x="8739578" y="5049392"/>
-            <a:ext cx="1427831" cy="824359"/>
+            <a:off x="5539906" y="2259470"/>
+            <a:ext cx="914400" cy="744200"/>
           </a:xfrm>
           <a:prstGeom prst="roundRect">
             <a:avLst/>
@@ -7239,7 +7687,7 @@
               <a:defRPr/>
             </a:pPr>
             <a:r>
-              <a:rPr kumimoji="0" lang="en-US" sz="1400" b="0" i="0" u="none" strike="noStrike" kern="0" cap="none" spc="0" normalizeH="0" baseline="0" noProof="0" dirty="0">
+              <a:rPr kumimoji="0" lang="en-US" sz="1200" b="0" i="0" u="none" strike="noStrike" kern="0" cap="none" spc="0" normalizeH="0" baseline="0" noProof="0" dirty="0">
                 <a:ln>
                   <a:noFill/>
                 </a:ln>
@@ -7254,48 +7702,9 @@
                 <a:cs typeface="+mn-cs"/>
                 <a:sym typeface="Arial"/>
               </a:rPr>
-              <a:t>Total ELectricity Loads (TELL)</a:t>
-            </a:r>
-          </a:p>
-        </p:txBody>
-      </p:sp>
-      <p:sp>
-        <p:nvSpPr>
-          <p:cNvPr id="54" name="Rounded Rectangle 53">
-            <a:extLst>
-              <a:ext uri="{FF2B5EF4-FFF2-40B4-BE49-F238E27FC236}">
-                <a16:creationId xmlns:a16="http://schemas.microsoft.com/office/drawing/2014/main" id="{2496E921-A9F4-D645-8C0F-4915E0C64BAC}"/>
-              </a:ext>
-            </a:extLst>
-          </p:cNvPr>
-          <p:cNvSpPr/>
-          <p:nvPr/>
-        </p:nvSpPr>
-        <p:spPr>
-          <a:xfrm>
-            <a:off x="8532303" y="2301675"/>
-            <a:ext cx="1339059" cy="968555"/>
-          </a:xfrm>
-          <a:prstGeom prst="roundRect">
-            <a:avLst/>
-          </a:prstGeom>
-          <a:solidFill>
-            <a:schemeClr val="bg1">
-              <a:lumMod val="50000"/>
-            </a:schemeClr>
-          </a:solidFill>
-          <a:ln w="25400" cap="flat" cmpd="sng" algn="ctr">
-            <a:solidFill>
-              <a:schemeClr val="tx1"/>
-            </a:solidFill>
-            <a:prstDash val="solid"/>
-            <a:miter lim="800000"/>
-          </a:ln>
-          <a:effectLst/>
-        </p:spPr>
-        <p:txBody>
-          <a:bodyPr rtlCol="0" anchor="ctr"/>
-          <a:lstStyle/>
+              <a:t>HDH/CDH</a:t>
+            </a:r>
+          </a:p>
           <a:p>
             <a:pPr marL="0" marR="0" lvl="0" indent="0" algn="ctr" defTabSz="914400" eaLnBrk="1" fontAlgn="auto" latinLnBrk="0" hangingPunct="1">
               <a:lnSpc>
@@ -7317,7 +7726,7 @@
               <a:defRPr/>
             </a:pPr>
             <a:r>
-              <a:rPr kumimoji="0" lang="en-US" sz="1400" b="0" i="0" u="none" strike="noStrike" kern="0" cap="none" spc="0" normalizeH="0" baseline="0" noProof="0" dirty="0">
+              <a:rPr kumimoji="0" lang="en-US" sz="1000" b="0" i="0" u="none" strike="noStrike" kern="0" cap="none" spc="0" normalizeH="0" baseline="0" noProof="0" dirty="0">
                 <a:ln>
                   <a:noFill/>
                 </a:ln>
@@ -7332,9 +7741,48 @@
                 <a:cs typeface="+mn-cs"/>
                 <a:sym typeface="Arial"/>
               </a:rPr>
-              <a:t>Power Plant Siting Feasibility</a:t>
-            </a:r>
-          </a:p>
+              <a:t>(Helios)</a:t>
+            </a:r>
+          </a:p>
+        </p:txBody>
+      </p:sp>
+      <p:sp>
+        <p:nvSpPr>
+          <p:cNvPr id="78" name="Rounded Rectangle 77">
+            <a:extLst>
+              <a:ext uri="{FF2B5EF4-FFF2-40B4-BE49-F238E27FC236}">
+                <a16:creationId xmlns:a16="http://schemas.microsoft.com/office/drawing/2014/main" id="{2213A539-FE75-2E49-97A2-21078ECCB86B}"/>
+              </a:ext>
+            </a:extLst>
+          </p:cNvPr>
+          <p:cNvSpPr/>
+          <p:nvPr/>
+        </p:nvSpPr>
+        <p:spPr>
+          <a:xfrm>
+            <a:off x="6502241" y="2259470"/>
+            <a:ext cx="914400" cy="744200"/>
+          </a:xfrm>
+          <a:prstGeom prst="roundRect">
+            <a:avLst/>
+          </a:prstGeom>
+          <a:solidFill>
+            <a:schemeClr val="bg1">
+              <a:lumMod val="50000"/>
+            </a:schemeClr>
+          </a:solidFill>
+          <a:ln w="25400" cap="flat" cmpd="sng" algn="ctr">
+            <a:solidFill>
+              <a:schemeClr val="tx1"/>
+            </a:solidFill>
+            <a:prstDash val="solid"/>
+            <a:miter lim="800000"/>
+          </a:ln>
+          <a:effectLst/>
+        </p:spPr>
+        <p:txBody>
+          <a:bodyPr rtlCol="0" anchor="ctr"/>
+          <a:lstStyle/>
           <a:p>
             <a:pPr marL="0" marR="0" lvl="0" indent="0" algn="ctr" defTabSz="914400" eaLnBrk="1" fontAlgn="auto" latinLnBrk="0" hangingPunct="1">
               <a:lnSpc>
@@ -7371,48 +7819,9 @@
                 <a:cs typeface="+mn-cs"/>
                 <a:sym typeface="Arial"/>
               </a:rPr>
-              <a:t>(CERF) </a:t>
-            </a:r>
-          </a:p>
-        </p:txBody>
-      </p:sp>
-      <p:sp>
-        <p:nvSpPr>
-          <p:cNvPr id="70" name="Rounded Rectangle 69">
-            <a:extLst>
-              <a:ext uri="{FF2B5EF4-FFF2-40B4-BE49-F238E27FC236}">
-                <a16:creationId xmlns:a16="http://schemas.microsoft.com/office/drawing/2014/main" id="{33144FA7-DB63-E44B-B5F6-03C886F88948}"/>
-              </a:ext>
-            </a:extLst>
-          </p:cNvPr>
-          <p:cNvSpPr/>
-          <p:nvPr/>
-        </p:nvSpPr>
-        <p:spPr>
-          <a:xfrm>
-            <a:off x="3630407" y="786870"/>
-            <a:ext cx="1332993" cy="856257"/>
-          </a:xfrm>
-          <a:prstGeom prst="roundRect">
-            <a:avLst/>
-          </a:prstGeom>
-          <a:solidFill>
-            <a:schemeClr val="bg1">
-              <a:lumMod val="50000"/>
-            </a:schemeClr>
-          </a:solidFill>
-          <a:ln w="25400" cap="flat" cmpd="sng" algn="ctr">
-            <a:solidFill>
-              <a:schemeClr val="tx1"/>
-            </a:solidFill>
-            <a:prstDash val="solid"/>
-            <a:miter lim="800000"/>
-          </a:ln>
-          <a:effectLst/>
-        </p:spPr>
-        <p:txBody>
-          <a:bodyPr rtlCol="0" anchor="ctr"/>
-          <a:lstStyle/>
+              <a:t>Ag Yield</a:t>
+            </a:r>
+          </a:p>
           <a:p>
             <a:pPr marL="0" marR="0" lvl="0" indent="0" algn="ctr" defTabSz="914400" eaLnBrk="1" fontAlgn="auto" latinLnBrk="0" hangingPunct="1">
               <a:lnSpc>
@@ -7434,421 +7843,14 @@
               <a:defRPr/>
             </a:pPr>
             <a:r>
-              <a:rPr kumimoji="0" lang="en-US" sz="1200" b="0" i="0" u="none" strike="noStrike" kern="0" cap="none" spc="0" normalizeH="0" baseline="0" noProof="0" dirty="0">
-                <a:ln>
-                  <a:noFill/>
-                </a:ln>
+              <a:rPr lang="en-US" sz="1000" kern="0" dirty="0">
                 <a:solidFill>
                   <a:srgbClr val="FFFFFF"/>
                 </a:solidFill>
-                <a:effectLst/>
-                <a:uLnTx/>
-                <a:uFillTx/>
                 <a:latin typeface="Calibri" panose="020F0502020204030204"/>
-                <a:ea typeface="+mn-ea"/>
-                <a:cs typeface="+mn-cs"/>
                 <a:sym typeface="Arial"/>
               </a:rPr>
-              <a:t>Thermodynamic Global Warming Simulations (WRF)</a:t>
-            </a:r>
-          </a:p>
-        </p:txBody>
-      </p:sp>
-      <p:sp>
-        <p:nvSpPr>
-          <p:cNvPr id="18" name="Rounded Rectangle 17">
-            <a:extLst>
-              <a:ext uri="{FF2B5EF4-FFF2-40B4-BE49-F238E27FC236}">
-                <a16:creationId xmlns:a16="http://schemas.microsoft.com/office/drawing/2014/main" id="{CB3773D0-064F-C840-942F-AED3E66D04EE}"/>
-              </a:ext>
-            </a:extLst>
-          </p:cNvPr>
-          <p:cNvSpPr/>
-          <p:nvPr/>
-        </p:nvSpPr>
-        <p:spPr>
-          <a:xfrm>
-            <a:off x="2715876" y="3799240"/>
-            <a:ext cx="1382139" cy="824359"/>
-          </a:xfrm>
-          <a:prstGeom prst="roundRect">
-            <a:avLst/>
-          </a:prstGeom>
-          <a:solidFill>
-            <a:schemeClr val="bg1">
-              <a:lumMod val="50000"/>
-            </a:schemeClr>
-          </a:solidFill>
-          <a:ln w="25400" cap="flat" cmpd="sng" algn="ctr">
-            <a:solidFill>
-              <a:schemeClr val="tx1"/>
-            </a:solidFill>
-            <a:prstDash val="solid"/>
-            <a:miter lim="800000"/>
-          </a:ln>
-          <a:effectLst/>
-        </p:spPr>
-        <p:txBody>
-          <a:bodyPr rtlCol="0" anchor="ctr"/>
-          <a:lstStyle/>
-          <a:p>
-            <a:pPr lvl="0" algn="ctr">
-              <a:buClr>
-                <a:srgbClr val="000000"/>
-              </a:buClr>
-              <a:defRPr/>
-            </a:pPr>
-            <a:r>
-              <a:rPr lang="en-US" sz="1400" kern="0" dirty="0">
-                <a:solidFill>
-                  <a:schemeClr val="bg1"/>
-                </a:solidFill>
-                <a:sym typeface="Arial"/>
-              </a:rPr>
-              <a:t>Gridded</a:t>
-            </a:r>
-          </a:p>
-          <a:p>
-            <a:pPr lvl="0" algn="ctr">
-              <a:buClr>
-                <a:srgbClr val="000000"/>
-              </a:buClr>
-              <a:defRPr/>
-            </a:pPr>
-            <a:r>
-              <a:rPr lang="en-US" sz="1400" kern="0" dirty="0">
-                <a:solidFill>
-                  <a:schemeClr val="bg1"/>
-                </a:solidFill>
-                <a:sym typeface="Arial"/>
-              </a:rPr>
-              <a:t>Population</a:t>
-            </a:r>
-          </a:p>
-        </p:txBody>
-      </p:sp>
-      <p:cxnSp>
-        <p:nvCxnSpPr>
-          <p:cNvPr id="93" name="Straight Arrow Connector 129">
-            <a:extLst>
-              <a:ext uri="{FF2B5EF4-FFF2-40B4-BE49-F238E27FC236}">
-                <a16:creationId xmlns:a16="http://schemas.microsoft.com/office/drawing/2014/main" id="{7BD44C0A-863E-4D8C-8FF5-E48E77AE9EFC}"/>
-              </a:ext>
-            </a:extLst>
-          </p:cNvPr>
-          <p:cNvCxnSpPr>
-            <a:cxnSpLocks/>
-            <a:stCxn id="78" idx="2"/>
-          </p:cNvCxnSpPr>
-          <p:nvPr/>
-        </p:nvCxnSpPr>
-        <p:spPr>
-          <a:xfrm rot="5400000">
-            <a:off x="5727723" y="3837522"/>
-            <a:ext cx="2065570" cy="397866"/>
-          </a:xfrm>
-          <a:prstGeom prst="bentConnector3">
-            <a:avLst>
-              <a:gd name="adj1" fmla="val 50000"/>
-            </a:avLst>
-          </a:prstGeom>
-          <a:noFill/>
-          <a:ln w="25400" cap="flat" cmpd="sng" algn="ctr">
-            <a:solidFill>
-              <a:schemeClr val="accent4">
-                <a:lumMod val="75000"/>
-              </a:schemeClr>
-            </a:solidFill>
-            <a:prstDash val="dash"/>
-            <a:miter lim="800000"/>
-            <a:tailEnd type="triangle" w="lg" len="lg"/>
-          </a:ln>
-          <a:effectLst/>
-        </p:spPr>
-      </p:cxnSp>
-      <p:sp>
-        <p:nvSpPr>
-          <p:cNvPr id="104" name="TextBox 103">
-            <a:extLst>
-              <a:ext uri="{FF2B5EF4-FFF2-40B4-BE49-F238E27FC236}">
-                <a16:creationId xmlns:a16="http://schemas.microsoft.com/office/drawing/2014/main" id="{8FF9DF29-8FC9-A74D-A896-3FC80ADACA58}"/>
-              </a:ext>
-            </a:extLst>
-          </p:cNvPr>
-          <p:cNvSpPr txBox="1"/>
-          <p:nvPr/>
-        </p:nvSpPr>
-        <p:spPr>
-          <a:xfrm>
-            <a:off x="6719891" y="3282553"/>
-            <a:ext cx="457490" cy="369332"/>
-          </a:xfrm>
-          <a:prstGeom prst="rect">
-            <a:avLst/>
-          </a:prstGeom>
-          <a:solidFill>
-            <a:schemeClr val="accent4">
-              <a:lumMod val="40000"/>
-              <a:lumOff val="60000"/>
-            </a:schemeClr>
-          </a:solidFill>
-          <a:ln w="25400">
-            <a:solidFill>
-              <a:schemeClr val="accent4">
-                <a:lumMod val="75000"/>
-              </a:schemeClr>
-            </a:solidFill>
-          </a:ln>
-        </p:spPr>
-        <p:txBody>
-          <a:bodyPr wrap="square" rtlCol="0">
-            <a:spAutoFit/>
-          </a:bodyPr>
-          <a:lstStyle/>
-          <a:p>
-            <a:pPr algn="ctr"/>
-            <a:r>
-              <a:rPr lang="en-US" b="1" dirty="0">
-                <a:solidFill>
-                  <a:schemeClr val="accent4">
-                    <a:lumMod val="75000"/>
-                  </a:schemeClr>
-                </a:solidFill>
-              </a:rPr>
-              <a:t>10</a:t>
-            </a:r>
-          </a:p>
-        </p:txBody>
-      </p:sp>
-      <p:cxnSp>
-        <p:nvCxnSpPr>
-          <p:cNvPr id="100" name="Straight Arrow Connector 129">
-            <a:extLst>
-              <a:ext uri="{FF2B5EF4-FFF2-40B4-BE49-F238E27FC236}">
-                <a16:creationId xmlns:a16="http://schemas.microsoft.com/office/drawing/2014/main" id="{DF79BE50-8645-45B8-9D27-56623488135F}"/>
-              </a:ext>
-            </a:extLst>
-          </p:cNvPr>
-          <p:cNvCxnSpPr>
-            <a:cxnSpLocks/>
-            <a:stCxn id="76" idx="2"/>
-          </p:cNvCxnSpPr>
-          <p:nvPr/>
-        </p:nvCxnSpPr>
-        <p:spPr>
-          <a:xfrm rot="16200000" flipH="1">
-            <a:off x="4260500" y="3777941"/>
-            <a:ext cx="2085801" cy="537258"/>
-          </a:xfrm>
-          <a:prstGeom prst="bentConnector3">
-            <a:avLst>
-              <a:gd name="adj1" fmla="val 50000"/>
-            </a:avLst>
-          </a:prstGeom>
-          <a:noFill/>
-          <a:ln w="25400" cap="flat" cmpd="sng" algn="ctr">
-            <a:solidFill>
-              <a:schemeClr val="accent4">
-                <a:lumMod val="75000"/>
-              </a:schemeClr>
-            </a:solidFill>
-            <a:prstDash val="dash"/>
-            <a:miter lim="800000"/>
-            <a:tailEnd type="triangle" w="lg" len="lg"/>
-          </a:ln>
-          <a:effectLst/>
-        </p:spPr>
-      </p:cxnSp>
-      <p:sp>
-        <p:nvSpPr>
-          <p:cNvPr id="90" name="TextBox 89">
-            <a:extLst>
-              <a:ext uri="{FF2B5EF4-FFF2-40B4-BE49-F238E27FC236}">
-                <a16:creationId xmlns:a16="http://schemas.microsoft.com/office/drawing/2014/main" id="{F72EDA13-3023-F544-9568-8433B3292E59}"/>
-              </a:ext>
-            </a:extLst>
-          </p:cNvPr>
-          <p:cNvSpPr txBox="1"/>
-          <p:nvPr/>
-        </p:nvSpPr>
-        <p:spPr>
-          <a:xfrm>
-            <a:off x="4886181" y="3270230"/>
-            <a:ext cx="297180" cy="369332"/>
-          </a:xfrm>
-          <a:prstGeom prst="rect">
-            <a:avLst/>
-          </a:prstGeom>
-          <a:solidFill>
-            <a:schemeClr val="accent4">
-              <a:lumMod val="40000"/>
-              <a:lumOff val="60000"/>
-            </a:schemeClr>
-          </a:solidFill>
-          <a:ln w="25400">
-            <a:solidFill>
-              <a:schemeClr val="accent4">
-                <a:lumMod val="75000"/>
-              </a:schemeClr>
-            </a:solidFill>
-          </a:ln>
-        </p:spPr>
-        <p:txBody>
-          <a:bodyPr wrap="square" rtlCol="0">
-            <a:spAutoFit/>
-          </a:bodyPr>
-          <a:lstStyle/>
-          <a:p>
-            <a:pPr algn="ctr"/>
-            <a:r>
-              <a:rPr lang="en-US" b="1" dirty="0">
-                <a:solidFill>
-                  <a:schemeClr val="accent4">
-                    <a:lumMod val="75000"/>
-                  </a:schemeClr>
-                </a:solidFill>
-              </a:rPr>
-              <a:t>8</a:t>
-            </a:r>
-          </a:p>
-        </p:txBody>
-      </p:sp>
-      <p:sp>
-        <p:nvSpPr>
-          <p:cNvPr id="107" name="TextBox 106">
-            <a:extLst>
-              <a:ext uri="{FF2B5EF4-FFF2-40B4-BE49-F238E27FC236}">
-                <a16:creationId xmlns:a16="http://schemas.microsoft.com/office/drawing/2014/main" id="{3218D5BB-EB76-46E2-93B4-9E1CD3B5EBDF}"/>
-              </a:ext>
-            </a:extLst>
-          </p:cNvPr>
-          <p:cNvSpPr txBox="1"/>
-          <p:nvPr/>
-        </p:nvSpPr>
-        <p:spPr>
-          <a:xfrm>
-            <a:off x="4296904" y="4095181"/>
-            <a:ext cx="1254197" cy="523220"/>
-          </a:xfrm>
-          <a:prstGeom prst="rect">
-            <a:avLst/>
-          </a:prstGeom>
-          <a:noFill/>
-        </p:spPr>
-        <p:txBody>
-          <a:bodyPr wrap="square" rtlCol="0">
-            <a:spAutoFit/>
-          </a:bodyPr>
-          <a:lstStyle/>
-          <a:p>
-            <a:pPr algn="r"/>
-            <a:r>
-              <a:rPr lang="en-US" sz="1400" b="1" dirty="0">
-                <a:solidFill>
-                  <a:schemeClr val="accent1"/>
-                </a:solidFill>
-              </a:rPr>
-              <a:t>Runoff by Basin</a:t>
-            </a:r>
-          </a:p>
-        </p:txBody>
-      </p:sp>
-      <p:sp>
-        <p:nvSpPr>
-          <p:cNvPr id="108" name="TextBox 107">
-            <a:extLst>
-              <a:ext uri="{FF2B5EF4-FFF2-40B4-BE49-F238E27FC236}">
-                <a16:creationId xmlns:a16="http://schemas.microsoft.com/office/drawing/2014/main" id="{C3C50344-8FCA-4773-B9F5-3FB195D364AB}"/>
-              </a:ext>
-            </a:extLst>
-          </p:cNvPr>
-          <p:cNvSpPr txBox="1"/>
-          <p:nvPr/>
-        </p:nvSpPr>
-        <p:spPr>
-          <a:xfrm>
-            <a:off x="5556928" y="3692019"/>
-            <a:ext cx="919721" cy="523220"/>
-          </a:xfrm>
-          <a:prstGeom prst="rect">
-            <a:avLst/>
-          </a:prstGeom>
-          <a:noFill/>
-        </p:spPr>
-        <p:txBody>
-          <a:bodyPr wrap="square" rtlCol="0">
-            <a:spAutoFit/>
-          </a:bodyPr>
-          <a:lstStyle/>
-          <a:p>
-            <a:pPr algn="ctr"/>
-            <a:r>
-              <a:rPr lang="en-US" sz="1400" b="1" dirty="0">
-                <a:solidFill>
-                  <a:schemeClr val="accent1"/>
-                </a:solidFill>
-              </a:rPr>
-              <a:t>HDD/CDD </a:t>
-            </a:r>
-          </a:p>
-          <a:p>
-            <a:pPr algn="ctr"/>
-            <a:r>
-              <a:rPr lang="en-US" sz="1400" b="1" dirty="0">
-                <a:solidFill>
-                  <a:schemeClr val="accent1"/>
-                </a:solidFill>
-              </a:rPr>
-              <a:t>by State</a:t>
-            </a:r>
-          </a:p>
-        </p:txBody>
-      </p:sp>
-      <p:sp>
-        <p:nvSpPr>
-          <p:cNvPr id="110" name="TextBox 109">
-            <a:extLst>
-              <a:ext uri="{FF2B5EF4-FFF2-40B4-BE49-F238E27FC236}">
-                <a16:creationId xmlns:a16="http://schemas.microsoft.com/office/drawing/2014/main" id="{F3216295-03FA-4A2C-AE62-DB57451FF6C1}"/>
-              </a:ext>
-            </a:extLst>
-          </p:cNvPr>
-          <p:cNvSpPr txBox="1"/>
-          <p:nvPr/>
-        </p:nvSpPr>
-        <p:spPr>
-          <a:xfrm>
-            <a:off x="6544079" y="4054962"/>
-            <a:ext cx="1254197" cy="523220"/>
-          </a:xfrm>
-          <a:prstGeom prst="rect">
-            <a:avLst/>
-          </a:prstGeom>
-          <a:noFill/>
-        </p:spPr>
-        <p:txBody>
-          <a:bodyPr wrap="square" rtlCol="0">
-            <a:spAutoFit/>
-          </a:bodyPr>
-          <a:lstStyle/>
-          <a:p>
-            <a:r>
-              <a:rPr lang="en-US" sz="1400" b="1" dirty="0">
-                <a:solidFill>
-                  <a:schemeClr val="accent1"/>
-                </a:solidFill>
-              </a:rPr>
-              <a:t>Ag Yields</a:t>
-            </a:r>
-          </a:p>
-          <a:p>
-            <a:r>
-              <a:rPr lang="en-US" sz="1400" b="1" dirty="0">
-                <a:solidFill>
-                  <a:schemeClr val="accent1"/>
-                </a:solidFill>
-              </a:rPr>
-              <a:t>By Basin</a:t>
+              <a:t>(Osiris)</a:t>
             </a:r>
           </a:p>
         </p:txBody>

</xml_diff>

<commit_message>
Updated progress in wiring diagram
</commit_message>
<xml_diff>
--- a/experiment_diagram/experiment-B-N6_interconnect.pptx
+++ b/experiment_diagram/experiment-B-N6_interconnect.pptx
@@ -816,7 +816,7 @@
           <a:p>
             <a:fld id="{50E52EA3-2204-804F-9678-85900D481E2E}" type="datetimeFigureOut">
               <a:rPr lang="en-US" smtClean="0"/>
-              <a:t>5/2/22</a:t>
+              <a:t>7/29/22</a:t>
             </a:fld>
             <a:endParaRPr lang="en-US"/>
           </a:p>
@@ -1014,7 +1014,7 @@
           <a:p>
             <a:fld id="{50E52EA3-2204-804F-9678-85900D481E2E}" type="datetimeFigureOut">
               <a:rPr lang="en-US" smtClean="0"/>
-              <a:t>5/2/22</a:t>
+              <a:t>7/29/22</a:t>
             </a:fld>
             <a:endParaRPr lang="en-US"/>
           </a:p>
@@ -1222,7 +1222,7 @@
           <a:p>
             <a:fld id="{50E52EA3-2204-804F-9678-85900D481E2E}" type="datetimeFigureOut">
               <a:rPr lang="en-US" smtClean="0"/>
-              <a:t>5/2/22</a:t>
+              <a:t>7/29/22</a:t>
             </a:fld>
             <a:endParaRPr lang="en-US"/>
           </a:p>
@@ -1420,7 +1420,7 @@
           <a:p>
             <a:fld id="{50E52EA3-2204-804F-9678-85900D481E2E}" type="datetimeFigureOut">
               <a:rPr lang="en-US" smtClean="0"/>
-              <a:t>5/2/22</a:t>
+              <a:t>7/29/22</a:t>
             </a:fld>
             <a:endParaRPr lang="en-US"/>
           </a:p>
@@ -1695,7 +1695,7 @@
           <a:p>
             <a:fld id="{50E52EA3-2204-804F-9678-85900D481E2E}" type="datetimeFigureOut">
               <a:rPr lang="en-US" smtClean="0"/>
-              <a:t>5/2/22</a:t>
+              <a:t>7/29/22</a:t>
             </a:fld>
             <a:endParaRPr lang="en-US"/>
           </a:p>
@@ -1960,7 +1960,7 @@
           <a:p>
             <a:fld id="{50E52EA3-2204-804F-9678-85900D481E2E}" type="datetimeFigureOut">
               <a:rPr lang="en-US" smtClean="0"/>
-              <a:t>5/2/22</a:t>
+              <a:t>7/29/22</a:t>
             </a:fld>
             <a:endParaRPr lang="en-US"/>
           </a:p>
@@ -2372,7 +2372,7 @@
           <a:p>
             <a:fld id="{50E52EA3-2204-804F-9678-85900D481E2E}" type="datetimeFigureOut">
               <a:rPr lang="en-US" smtClean="0"/>
-              <a:t>5/2/22</a:t>
+              <a:t>7/29/22</a:t>
             </a:fld>
             <a:endParaRPr lang="en-US"/>
           </a:p>
@@ -2513,7 +2513,7 @@
           <a:p>
             <a:fld id="{50E52EA3-2204-804F-9678-85900D481E2E}" type="datetimeFigureOut">
               <a:rPr lang="en-US" smtClean="0"/>
-              <a:t>5/2/22</a:t>
+              <a:t>7/29/22</a:t>
             </a:fld>
             <a:endParaRPr lang="en-US"/>
           </a:p>
@@ -2626,7 +2626,7 @@
           <a:p>
             <a:fld id="{50E52EA3-2204-804F-9678-85900D481E2E}" type="datetimeFigureOut">
               <a:rPr lang="en-US" smtClean="0"/>
-              <a:t>5/2/22</a:t>
+              <a:t>7/29/22</a:t>
             </a:fld>
             <a:endParaRPr lang="en-US"/>
           </a:p>
@@ -2937,7 +2937,7 @@
           <a:p>
             <a:fld id="{50E52EA3-2204-804F-9678-85900D481E2E}" type="datetimeFigureOut">
               <a:rPr lang="en-US" smtClean="0"/>
-              <a:t>5/2/22</a:t>
+              <a:t>7/29/22</a:t>
             </a:fld>
             <a:endParaRPr lang="en-US"/>
           </a:p>
@@ -3225,7 +3225,7 @@
           <a:p>
             <a:fld id="{50E52EA3-2204-804F-9678-85900D481E2E}" type="datetimeFigureOut">
               <a:rPr lang="en-US" smtClean="0"/>
-              <a:t>5/2/22</a:t>
+              <a:t>7/29/22</a:t>
             </a:fld>
             <a:endParaRPr lang="en-US"/>
           </a:p>
@@ -3466,7 +3466,7 @@
           <a:p>
             <a:fld id="{50E52EA3-2204-804F-9678-85900D481E2E}" type="datetimeFigureOut">
               <a:rPr lang="en-US" smtClean="0"/>
-              <a:t>5/2/22</a:t>
+              <a:t>7/29/22</a:t>
             </a:fld>
             <a:endParaRPr lang="en-US"/>
           </a:p>
@@ -4343,9 +4343,11 @@
           <a:noFill/>
           <a:ln w="25400" cap="flat" cmpd="sng" algn="ctr">
             <a:solidFill>
-              <a:srgbClr val="C00000"/>
+              <a:schemeClr val="accent4">
+                <a:lumMod val="75000"/>
+              </a:schemeClr>
             </a:solidFill>
-            <a:prstDash val="sysDot"/>
+            <a:prstDash val="dash"/>
             <a:miter lim="800000"/>
             <a:tailEnd type="triangle" w="lg" len="lg"/>
           </a:ln>
@@ -4460,9 +4462,11 @@
           <a:noFill/>
           <a:ln w="25400" cap="flat" cmpd="sng" algn="ctr">
             <a:solidFill>
-              <a:srgbClr val="C00000"/>
+              <a:schemeClr val="accent4">
+                <a:lumMod val="75000"/>
+              </a:schemeClr>
             </a:solidFill>
-            <a:prstDash val="sysDot"/>
+            <a:prstDash val="dash"/>
             <a:miter lim="800000"/>
             <a:tailEnd type="triangle" w="lg" len="lg"/>
           </a:ln>
@@ -4495,9 +4499,11 @@
           <a:noFill/>
           <a:ln w="25400" cap="flat" cmpd="sng" algn="ctr">
             <a:solidFill>
-              <a:srgbClr val="C00000"/>
+              <a:schemeClr val="accent4">
+                <a:lumMod val="75000"/>
+              </a:schemeClr>
             </a:solidFill>
-            <a:prstDash val="sysDot"/>
+            <a:prstDash val="dash"/>
             <a:miter lim="800000"/>
             <a:headEnd type="triangle" w="lg" len="lg"/>
             <a:tailEnd type="none" w="lg" len="lg"/>
@@ -4884,11 +4890,11 @@
           <a:noFill/>
           <a:ln w="25400" cap="flat" cmpd="sng" algn="ctr">
             <a:solidFill>
-              <a:schemeClr val="accent4">
+              <a:schemeClr val="accent6">
                 <a:lumMod val="75000"/>
               </a:schemeClr>
             </a:solidFill>
-            <a:prstDash val="dash"/>
+            <a:prstDash val="solid"/>
             <a:miter lim="800000"/>
             <a:tailEnd type="triangle" w="lg" len="lg"/>
           </a:ln>
@@ -5119,11 +5125,11 @@
           <a:noFill/>
           <a:ln w="25400" cap="flat" cmpd="sng" algn="ctr">
             <a:solidFill>
-              <a:schemeClr val="accent4">
+              <a:schemeClr val="accent6">
                 <a:lumMod val="75000"/>
               </a:schemeClr>
             </a:solidFill>
-            <a:prstDash val="dash"/>
+            <a:prstDash val="solid"/>
             <a:miter lim="800000"/>
             <a:tailEnd type="triangle" w="lg" len="lg"/>
           </a:ln>
@@ -5157,11 +5163,11 @@
           <a:noFill/>
           <a:ln w="25400" cap="flat" cmpd="sng" algn="ctr">
             <a:solidFill>
-              <a:schemeClr val="accent4">
+              <a:schemeClr val="accent6">
                 <a:lumMod val="75000"/>
               </a:schemeClr>
             </a:solidFill>
-            <a:prstDash val="dash"/>
+            <a:prstDash val="solid"/>
             <a:miter lim="800000"/>
             <a:tailEnd type="triangle" w="lg" len="lg"/>
           </a:ln>
@@ -5193,11 +5199,11 @@
           <a:noFill/>
           <a:ln w="25400" cap="flat" cmpd="sng" algn="ctr">
             <a:solidFill>
-              <a:schemeClr val="accent4">
+              <a:schemeClr val="accent6">
                 <a:lumMod val="75000"/>
               </a:schemeClr>
             </a:solidFill>
-            <a:prstDash val="dash"/>
+            <a:prstDash val="solid"/>
             <a:miter lim="800000"/>
             <a:tailEnd type="triangle" w="lg" len="lg"/>
           </a:ln>
@@ -5838,14 +5844,14 @@
             <a:avLst/>
           </a:prstGeom>
           <a:solidFill>
-            <a:schemeClr val="accent4">
+            <a:schemeClr val="accent6">
               <a:lumMod val="40000"/>
               <a:lumOff val="60000"/>
             </a:schemeClr>
           </a:solidFill>
           <a:ln w="25400">
             <a:solidFill>
-              <a:schemeClr val="accent4">
+              <a:schemeClr val="accent6">
                 <a:lumMod val="75000"/>
               </a:schemeClr>
             </a:solidFill>
@@ -5861,7 +5867,7 @@
             <a:r>
               <a:rPr lang="en-US" b="1" dirty="0">
                 <a:solidFill>
-                  <a:schemeClr val="accent4">
+                  <a:schemeClr val="accent6">
                     <a:lumMod val="75000"/>
                   </a:schemeClr>
                 </a:solidFill>
@@ -5887,6 +5893,384 @@
           <a:xfrm>
             <a:off x="5848517" y="1696144"/>
             <a:ext cx="297180" cy="369332"/>
+          </a:xfrm>
+          <a:prstGeom prst="rect">
+            <a:avLst/>
+          </a:prstGeom>
+          <a:solidFill>
+            <a:schemeClr val="accent6">
+              <a:lumMod val="40000"/>
+              <a:lumOff val="60000"/>
+            </a:schemeClr>
+          </a:solidFill>
+          <a:ln w="25400">
+            <a:solidFill>
+              <a:schemeClr val="accent6">
+                <a:lumMod val="75000"/>
+              </a:schemeClr>
+            </a:solidFill>
+          </a:ln>
+        </p:spPr>
+        <p:txBody>
+          <a:bodyPr wrap="square" rtlCol="0">
+            <a:spAutoFit/>
+          </a:bodyPr>
+          <a:lstStyle/>
+          <a:p>
+            <a:pPr algn="ctr"/>
+            <a:r>
+              <a:rPr lang="en-US" b="1" dirty="0">
+                <a:solidFill>
+                  <a:schemeClr val="accent6">
+                    <a:lumMod val="75000"/>
+                  </a:schemeClr>
+                </a:solidFill>
+              </a:rPr>
+              <a:t>2</a:t>
+            </a:r>
+          </a:p>
+        </p:txBody>
+      </p:sp>
+      <p:sp>
+        <p:nvSpPr>
+          <p:cNvPr id="81" name="TextBox 80">
+            <a:extLst>
+              <a:ext uri="{FF2B5EF4-FFF2-40B4-BE49-F238E27FC236}">
+                <a16:creationId xmlns:a16="http://schemas.microsoft.com/office/drawing/2014/main" id="{4F258ED9-EC4A-6146-92F1-A7D878A4A006}"/>
+              </a:ext>
+            </a:extLst>
+          </p:cNvPr>
+          <p:cNvSpPr txBox="1"/>
+          <p:nvPr/>
+        </p:nvSpPr>
+        <p:spPr>
+          <a:xfrm>
+            <a:off x="6817783" y="1696144"/>
+            <a:ext cx="297180" cy="369332"/>
+          </a:xfrm>
+          <a:prstGeom prst="rect">
+            <a:avLst/>
+          </a:prstGeom>
+          <a:solidFill>
+            <a:schemeClr val="accent6">
+              <a:lumMod val="40000"/>
+              <a:lumOff val="60000"/>
+            </a:schemeClr>
+          </a:solidFill>
+          <a:ln w="25400">
+            <a:solidFill>
+              <a:schemeClr val="accent6">
+                <a:lumMod val="75000"/>
+              </a:schemeClr>
+            </a:solidFill>
+          </a:ln>
+        </p:spPr>
+        <p:txBody>
+          <a:bodyPr wrap="square" rtlCol="0">
+            <a:spAutoFit/>
+          </a:bodyPr>
+          <a:lstStyle/>
+          <a:p>
+            <a:pPr algn="ctr"/>
+            <a:r>
+              <a:rPr lang="en-US" b="1" dirty="0">
+                <a:solidFill>
+                  <a:schemeClr val="accent6">
+                    <a:lumMod val="75000"/>
+                  </a:schemeClr>
+                </a:solidFill>
+              </a:rPr>
+              <a:t>3</a:t>
+            </a:r>
+          </a:p>
+        </p:txBody>
+      </p:sp>
+      <p:sp>
+        <p:nvSpPr>
+          <p:cNvPr id="85" name="TextBox 84">
+            <a:extLst>
+              <a:ext uri="{FF2B5EF4-FFF2-40B4-BE49-F238E27FC236}">
+                <a16:creationId xmlns:a16="http://schemas.microsoft.com/office/drawing/2014/main" id="{EE4152AD-6E88-E645-994E-833183D46272}"/>
+              </a:ext>
+            </a:extLst>
+          </p:cNvPr>
+          <p:cNvSpPr txBox="1"/>
+          <p:nvPr/>
+        </p:nvSpPr>
+        <p:spPr>
+          <a:xfrm>
+            <a:off x="4148184" y="3055338"/>
+            <a:ext cx="297180" cy="369332"/>
+          </a:xfrm>
+          <a:prstGeom prst="rect">
+            <a:avLst/>
+          </a:prstGeom>
+          <a:solidFill>
+            <a:schemeClr val="accent6">
+              <a:lumMod val="40000"/>
+              <a:lumOff val="60000"/>
+            </a:schemeClr>
+          </a:solidFill>
+          <a:ln w="25400">
+            <a:solidFill>
+              <a:schemeClr val="accent6">
+                <a:lumMod val="75000"/>
+              </a:schemeClr>
+            </a:solidFill>
+          </a:ln>
+        </p:spPr>
+        <p:txBody>
+          <a:bodyPr wrap="square" rtlCol="0">
+            <a:spAutoFit/>
+          </a:bodyPr>
+          <a:lstStyle/>
+          <a:p>
+            <a:pPr algn="ctr"/>
+            <a:r>
+              <a:rPr lang="en-US" b="1" dirty="0">
+                <a:solidFill>
+                  <a:schemeClr val="accent6">
+                    <a:lumMod val="75000"/>
+                  </a:schemeClr>
+                </a:solidFill>
+              </a:rPr>
+              <a:t>4</a:t>
+            </a:r>
+          </a:p>
+        </p:txBody>
+      </p:sp>
+      <p:sp>
+        <p:nvSpPr>
+          <p:cNvPr id="88" name="TextBox 87">
+            <a:extLst>
+              <a:ext uri="{FF2B5EF4-FFF2-40B4-BE49-F238E27FC236}">
+                <a16:creationId xmlns:a16="http://schemas.microsoft.com/office/drawing/2014/main" id="{B2109F4C-9694-BD4C-8273-4C27F4E653F1}"/>
+              </a:ext>
+            </a:extLst>
+          </p:cNvPr>
+          <p:cNvSpPr txBox="1"/>
+          <p:nvPr/>
+        </p:nvSpPr>
+        <p:spPr>
+          <a:xfrm>
+            <a:off x="3729782" y="5040932"/>
+            <a:ext cx="297180" cy="369332"/>
+          </a:xfrm>
+          <a:prstGeom prst="rect">
+            <a:avLst/>
+          </a:prstGeom>
+          <a:solidFill>
+            <a:schemeClr val="accent6">
+              <a:lumMod val="40000"/>
+              <a:lumOff val="60000"/>
+            </a:schemeClr>
+          </a:solidFill>
+          <a:ln w="25400">
+            <a:solidFill>
+              <a:schemeClr val="accent6">
+                <a:lumMod val="75000"/>
+              </a:schemeClr>
+            </a:solidFill>
+          </a:ln>
+        </p:spPr>
+        <p:txBody>
+          <a:bodyPr wrap="square" rtlCol="0">
+            <a:spAutoFit/>
+          </a:bodyPr>
+          <a:lstStyle/>
+          <a:p>
+            <a:pPr algn="ctr"/>
+            <a:r>
+              <a:rPr lang="en-US" b="1" dirty="0">
+                <a:solidFill>
+                  <a:schemeClr val="accent6">
+                    <a:lumMod val="75000"/>
+                  </a:schemeClr>
+                </a:solidFill>
+              </a:rPr>
+              <a:t>6</a:t>
+            </a:r>
+          </a:p>
+        </p:txBody>
+      </p:sp>
+      <p:sp>
+        <p:nvSpPr>
+          <p:cNvPr id="89" name="TextBox 88">
+            <a:extLst>
+              <a:ext uri="{FF2B5EF4-FFF2-40B4-BE49-F238E27FC236}">
+                <a16:creationId xmlns:a16="http://schemas.microsoft.com/office/drawing/2014/main" id="{741C2CDB-C418-E240-9824-F33B6FB55B1F}"/>
+              </a:ext>
+            </a:extLst>
+          </p:cNvPr>
+          <p:cNvSpPr txBox="1"/>
+          <p:nvPr/>
+        </p:nvSpPr>
+        <p:spPr>
+          <a:xfrm>
+            <a:off x="5238280" y="6468265"/>
+            <a:ext cx="297180" cy="369332"/>
+          </a:xfrm>
+          <a:prstGeom prst="rect">
+            <a:avLst/>
+          </a:prstGeom>
+          <a:solidFill>
+            <a:schemeClr val="accent6">
+              <a:lumMod val="40000"/>
+              <a:lumOff val="60000"/>
+            </a:schemeClr>
+          </a:solidFill>
+          <a:ln w="25400">
+            <a:solidFill>
+              <a:schemeClr val="accent6">
+                <a:lumMod val="75000"/>
+              </a:schemeClr>
+            </a:solidFill>
+          </a:ln>
+        </p:spPr>
+        <p:txBody>
+          <a:bodyPr wrap="square" rtlCol="0">
+            <a:spAutoFit/>
+          </a:bodyPr>
+          <a:lstStyle/>
+          <a:p>
+            <a:pPr algn="ctr"/>
+            <a:r>
+              <a:rPr lang="en-US" b="1" dirty="0">
+                <a:solidFill>
+                  <a:schemeClr val="accent6">
+                    <a:lumMod val="75000"/>
+                  </a:schemeClr>
+                </a:solidFill>
+              </a:rPr>
+              <a:t>7</a:t>
+            </a:r>
+          </a:p>
+        </p:txBody>
+      </p:sp>
+      <p:sp>
+        <p:nvSpPr>
+          <p:cNvPr id="92" name="TextBox 91">
+            <a:extLst>
+              <a:ext uri="{FF2B5EF4-FFF2-40B4-BE49-F238E27FC236}">
+                <a16:creationId xmlns:a16="http://schemas.microsoft.com/office/drawing/2014/main" id="{C8B9378D-E069-5E43-A1D1-C030C23C26D6}"/>
+              </a:ext>
+            </a:extLst>
+          </p:cNvPr>
+          <p:cNvSpPr txBox="1"/>
+          <p:nvPr/>
+        </p:nvSpPr>
+        <p:spPr>
+          <a:xfrm>
+            <a:off x="5907530" y="3286469"/>
+            <a:ext cx="297180" cy="369332"/>
+          </a:xfrm>
+          <a:prstGeom prst="rect">
+            <a:avLst/>
+          </a:prstGeom>
+          <a:solidFill>
+            <a:schemeClr val="accent6">
+              <a:lumMod val="40000"/>
+              <a:lumOff val="60000"/>
+            </a:schemeClr>
+          </a:solidFill>
+          <a:ln w="25400">
+            <a:solidFill>
+              <a:schemeClr val="accent6">
+                <a:lumMod val="75000"/>
+              </a:schemeClr>
+            </a:solidFill>
+          </a:ln>
+        </p:spPr>
+        <p:txBody>
+          <a:bodyPr wrap="square" rtlCol="0">
+            <a:spAutoFit/>
+          </a:bodyPr>
+          <a:lstStyle/>
+          <a:p>
+            <a:pPr algn="ctr"/>
+            <a:r>
+              <a:rPr lang="en-US" b="1" dirty="0">
+                <a:solidFill>
+                  <a:schemeClr val="accent6">
+                    <a:lumMod val="75000"/>
+                  </a:schemeClr>
+                </a:solidFill>
+              </a:rPr>
+              <a:t>9</a:t>
+            </a:r>
+          </a:p>
+        </p:txBody>
+      </p:sp>
+      <p:sp>
+        <p:nvSpPr>
+          <p:cNvPr id="94" name="TextBox 93">
+            <a:extLst>
+              <a:ext uri="{FF2B5EF4-FFF2-40B4-BE49-F238E27FC236}">
+                <a16:creationId xmlns:a16="http://schemas.microsoft.com/office/drawing/2014/main" id="{0CC0ADAB-FFED-C340-A9EF-F806DD0E31E1}"/>
+              </a:ext>
+            </a:extLst>
+          </p:cNvPr>
+          <p:cNvSpPr txBox="1"/>
+          <p:nvPr/>
+        </p:nvSpPr>
+        <p:spPr>
+          <a:xfrm>
+            <a:off x="7743647" y="5276905"/>
+            <a:ext cx="481986" cy="369332"/>
+          </a:xfrm>
+          <a:prstGeom prst="rect">
+            <a:avLst/>
+          </a:prstGeom>
+          <a:solidFill>
+            <a:schemeClr val="accent6">
+              <a:lumMod val="40000"/>
+              <a:lumOff val="60000"/>
+            </a:schemeClr>
+          </a:solidFill>
+          <a:ln w="25400">
+            <a:solidFill>
+              <a:schemeClr val="accent6">
+                <a:lumMod val="75000"/>
+              </a:schemeClr>
+            </a:solidFill>
+          </a:ln>
+        </p:spPr>
+        <p:txBody>
+          <a:bodyPr wrap="square" rtlCol="0">
+            <a:spAutoFit/>
+          </a:bodyPr>
+          <a:lstStyle/>
+          <a:p>
+            <a:pPr algn="ctr"/>
+            <a:r>
+              <a:rPr lang="en-US" b="1" dirty="0">
+                <a:solidFill>
+                  <a:schemeClr val="accent6">
+                    <a:lumMod val="75000"/>
+                  </a:schemeClr>
+                </a:solidFill>
+              </a:rPr>
+              <a:t>11</a:t>
+            </a:r>
+          </a:p>
+        </p:txBody>
+      </p:sp>
+      <p:sp>
+        <p:nvSpPr>
+          <p:cNvPr id="95" name="TextBox 94">
+            <a:extLst>
+              <a:ext uri="{FF2B5EF4-FFF2-40B4-BE49-F238E27FC236}">
+                <a16:creationId xmlns:a16="http://schemas.microsoft.com/office/drawing/2014/main" id="{955074F7-B7FF-8B4A-A57E-D123CD396386}"/>
+              </a:ext>
+            </a:extLst>
+          </p:cNvPr>
+          <p:cNvSpPr txBox="1"/>
+          <p:nvPr/>
+        </p:nvSpPr>
+        <p:spPr>
+          <a:xfrm>
+            <a:off x="7369991" y="3552308"/>
+            <a:ext cx="481986" cy="369332"/>
           </a:xfrm>
           <a:prstGeom prst="rect">
             <a:avLst/>
@@ -5920,17 +6304,17 @@
                   </a:schemeClr>
                 </a:solidFill>
               </a:rPr>
-              <a:t>2</a:t>
-            </a:r>
-          </a:p>
-        </p:txBody>
-      </p:sp>
-      <p:sp>
-        <p:nvSpPr>
-          <p:cNvPr id="81" name="TextBox 80">
-            <a:extLst>
-              <a:ext uri="{FF2B5EF4-FFF2-40B4-BE49-F238E27FC236}">
-                <a16:creationId xmlns:a16="http://schemas.microsoft.com/office/drawing/2014/main" id="{4F258ED9-EC4A-6146-92F1-A7D878A4A006}"/>
+              <a:t>12</a:t>
+            </a:r>
+          </a:p>
+        </p:txBody>
+      </p:sp>
+      <p:sp>
+        <p:nvSpPr>
+          <p:cNvPr id="96" name="TextBox 95">
+            <a:extLst>
+              <a:ext uri="{FF2B5EF4-FFF2-40B4-BE49-F238E27FC236}">
+                <a16:creationId xmlns:a16="http://schemas.microsoft.com/office/drawing/2014/main" id="{F5995287-6C5B-2049-BDBC-7533E75F350E}"/>
               </a:ext>
             </a:extLst>
           </p:cNvPr>
@@ -5939,8 +6323,8 @@
         </p:nvSpPr>
         <p:spPr>
           <a:xfrm>
-            <a:off x="6817783" y="1696144"/>
-            <a:ext cx="297180" cy="369332"/>
+            <a:off x="9471708" y="4040918"/>
+            <a:ext cx="481986" cy="369332"/>
           </a:xfrm>
           <a:prstGeom prst="rect">
             <a:avLst/>
@@ -5974,17 +6358,17 @@
                   </a:schemeClr>
                 </a:solidFill>
               </a:rPr>
-              <a:t>3</a:t>
-            </a:r>
-          </a:p>
-        </p:txBody>
-      </p:sp>
-      <p:sp>
-        <p:nvSpPr>
-          <p:cNvPr id="85" name="TextBox 84">
-            <a:extLst>
-              <a:ext uri="{FF2B5EF4-FFF2-40B4-BE49-F238E27FC236}">
-                <a16:creationId xmlns:a16="http://schemas.microsoft.com/office/drawing/2014/main" id="{EE4152AD-6E88-E645-994E-833183D46272}"/>
+              <a:t>13</a:t>
+            </a:r>
+          </a:p>
+        </p:txBody>
+      </p:sp>
+      <p:sp>
+        <p:nvSpPr>
+          <p:cNvPr id="97" name="TextBox 96">
+            <a:extLst>
+              <a:ext uri="{FF2B5EF4-FFF2-40B4-BE49-F238E27FC236}">
+                <a16:creationId xmlns:a16="http://schemas.microsoft.com/office/drawing/2014/main" id="{E713F805-3CF5-684C-81FB-5D5321772451}"/>
               </a:ext>
             </a:extLst>
           </p:cNvPr>
@@ -5993,170 +6377,8 @@
         </p:nvSpPr>
         <p:spPr>
           <a:xfrm>
-            <a:off x="4148184" y="3055338"/>
-            <a:ext cx="297180" cy="369332"/>
-          </a:xfrm>
-          <a:prstGeom prst="rect">
-            <a:avLst/>
-          </a:prstGeom>
-          <a:solidFill>
-            <a:schemeClr val="accent6">
-              <a:lumMod val="40000"/>
-              <a:lumOff val="60000"/>
-            </a:schemeClr>
-          </a:solidFill>
-          <a:ln w="25400">
-            <a:solidFill>
-              <a:schemeClr val="accent6">
-                <a:lumMod val="75000"/>
-              </a:schemeClr>
-            </a:solidFill>
-          </a:ln>
-        </p:spPr>
-        <p:txBody>
-          <a:bodyPr wrap="square" rtlCol="0">
-            <a:spAutoFit/>
-          </a:bodyPr>
-          <a:lstStyle/>
-          <a:p>
-            <a:pPr algn="ctr"/>
-            <a:r>
-              <a:rPr lang="en-US" b="1" dirty="0">
-                <a:solidFill>
-                  <a:schemeClr val="accent6">
-                    <a:lumMod val="75000"/>
-                  </a:schemeClr>
-                </a:solidFill>
-              </a:rPr>
-              <a:t>4</a:t>
-            </a:r>
-          </a:p>
-        </p:txBody>
-      </p:sp>
-      <p:sp>
-        <p:nvSpPr>
-          <p:cNvPr id="88" name="TextBox 87">
-            <a:extLst>
-              <a:ext uri="{FF2B5EF4-FFF2-40B4-BE49-F238E27FC236}">
-                <a16:creationId xmlns:a16="http://schemas.microsoft.com/office/drawing/2014/main" id="{B2109F4C-9694-BD4C-8273-4C27F4E653F1}"/>
-              </a:ext>
-            </a:extLst>
-          </p:cNvPr>
-          <p:cNvSpPr txBox="1"/>
-          <p:nvPr/>
-        </p:nvSpPr>
-        <p:spPr>
-          <a:xfrm>
-            <a:off x="3729782" y="5040932"/>
-            <a:ext cx="297180" cy="369332"/>
-          </a:xfrm>
-          <a:prstGeom prst="rect">
-            <a:avLst/>
-          </a:prstGeom>
-          <a:solidFill>
-            <a:schemeClr val="accent6">
-              <a:lumMod val="40000"/>
-              <a:lumOff val="60000"/>
-            </a:schemeClr>
-          </a:solidFill>
-          <a:ln w="25400">
-            <a:solidFill>
-              <a:schemeClr val="accent6">
-                <a:lumMod val="75000"/>
-              </a:schemeClr>
-            </a:solidFill>
-          </a:ln>
-        </p:spPr>
-        <p:txBody>
-          <a:bodyPr wrap="square" rtlCol="0">
-            <a:spAutoFit/>
-          </a:bodyPr>
-          <a:lstStyle/>
-          <a:p>
-            <a:pPr algn="ctr"/>
-            <a:r>
-              <a:rPr lang="en-US" b="1" dirty="0">
-                <a:solidFill>
-                  <a:schemeClr val="accent6">
-                    <a:lumMod val="75000"/>
-                  </a:schemeClr>
-                </a:solidFill>
-              </a:rPr>
-              <a:t>6</a:t>
-            </a:r>
-          </a:p>
-        </p:txBody>
-      </p:sp>
-      <p:sp>
-        <p:nvSpPr>
-          <p:cNvPr id="89" name="TextBox 88">
-            <a:extLst>
-              <a:ext uri="{FF2B5EF4-FFF2-40B4-BE49-F238E27FC236}">
-                <a16:creationId xmlns:a16="http://schemas.microsoft.com/office/drawing/2014/main" id="{741C2CDB-C418-E240-9824-F33B6FB55B1F}"/>
-              </a:ext>
-            </a:extLst>
-          </p:cNvPr>
-          <p:cNvSpPr txBox="1"/>
-          <p:nvPr/>
-        </p:nvSpPr>
-        <p:spPr>
-          <a:xfrm>
-            <a:off x="5238280" y="6468265"/>
-            <a:ext cx="297180" cy="369332"/>
-          </a:xfrm>
-          <a:prstGeom prst="rect">
-            <a:avLst/>
-          </a:prstGeom>
-          <a:solidFill>
-            <a:schemeClr val="accent6">
-              <a:lumMod val="40000"/>
-              <a:lumOff val="60000"/>
-            </a:schemeClr>
-          </a:solidFill>
-          <a:ln w="25400">
-            <a:solidFill>
-              <a:schemeClr val="accent6">
-                <a:lumMod val="75000"/>
-              </a:schemeClr>
-            </a:solidFill>
-          </a:ln>
-        </p:spPr>
-        <p:txBody>
-          <a:bodyPr wrap="square" rtlCol="0">
-            <a:spAutoFit/>
-          </a:bodyPr>
-          <a:lstStyle/>
-          <a:p>
-            <a:pPr algn="ctr"/>
-            <a:r>
-              <a:rPr lang="en-US" b="1" dirty="0">
-                <a:solidFill>
-                  <a:schemeClr val="accent6">
-                    <a:lumMod val="75000"/>
-                  </a:schemeClr>
-                </a:solidFill>
-              </a:rPr>
-              <a:t>7</a:t>
-            </a:r>
-          </a:p>
-        </p:txBody>
-      </p:sp>
-      <p:sp>
-        <p:nvSpPr>
-          <p:cNvPr id="92" name="TextBox 91">
-            <a:extLst>
-              <a:ext uri="{FF2B5EF4-FFF2-40B4-BE49-F238E27FC236}">
-                <a16:creationId xmlns:a16="http://schemas.microsoft.com/office/drawing/2014/main" id="{C8B9378D-E069-5E43-A1D1-C030C23C26D6}"/>
-              </a:ext>
-            </a:extLst>
-          </p:cNvPr>
-          <p:cNvSpPr txBox="1"/>
-          <p:nvPr/>
-        </p:nvSpPr>
-        <p:spPr>
-          <a:xfrm>
-            <a:off x="5907530" y="3286469"/>
-            <a:ext cx="297180" cy="369332"/>
+            <a:off x="10692935" y="4898507"/>
+            <a:ext cx="481986" cy="369332"/>
           </a:xfrm>
           <a:prstGeom prst="rect">
             <a:avLst/>
@@ -6190,17 +6412,17 @@
                   </a:schemeClr>
                 </a:solidFill>
               </a:rPr>
-              <a:t>9</a:t>
-            </a:r>
-          </a:p>
-        </p:txBody>
-      </p:sp>
-      <p:sp>
-        <p:nvSpPr>
-          <p:cNvPr id="94" name="TextBox 93">
-            <a:extLst>
-              <a:ext uri="{FF2B5EF4-FFF2-40B4-BE49-F238E27FC236}">
-                <a16:creationId xmlns:a16="http://schemas.microsoft.com/office/drawing/2014/main" id="{0CC0ADAB-FFED-C340-A9EF-F806DD0E31E1}"/>
+              <a:t>14</a:t>
+            </a:r>
+          </a:p>
+        </p:txBody>
+      </p:sp>
+      <p:sp>
+        <p:nvSpPr>
+          <p:cNvPr id="98" name="TextBox 97">
+            <a:extLst>
+              <a:ext uri="{FF2B5EF4-FFF2-40B4-BE49-F238E27FC236}">
+                <a16:creationId xmlns:a16="http://schemas.microsoft.com/office/drawing/2014/main" id="{4E29A9A4-6A48-9348-AF91-21BA80C6C07B}"/>
               </a:ext>
             </a:extLst>
           </p:cNvPr>
@@ -6209,61 +6431,7 @@
         </p:nvSpPr>
         <p:spPr>
           <a:xfrm>
-            <a:off x="7743647" y="5276905"/>
-            <a:ext cx="481986" cy="369332"/>
-          </a:xfrm>
-          <a:prstGeom prst="rect">
-            <a:avLst/>
-          </a:prstGeom>
-          <a:solidFill>
-            <a:schemeClr val="accent6">
-              <a:lumMod val="40000"/>
-              <a:lumOff val="60000"/>
-            </a:schemeClr>
-          </a:solidFill>
-          <a:ln w="25400">
-            <a:solidFill>
-              <a:schemeClr val="accent6">
-                <a:lumMod val="75000"/>
-              </a:schemeClr>
-            </a:solidFill>
-          </a:ln>
-        </p:spPr>
-        <p:txBody>
-          <a:bodyPr wrap="square" rtlCol="0">
-            <a:spAutoFit/>
-          </a:bodyPr>
-          <a:lstStyle/>
-          <a:p>
-            <a:pPr algn="ctr"/>
-            <a:r>
-              <a:rPr lang="en-US" b="1" dirty="0">
-                <a:solidFill>
-                  <a:schemeClr val="accent6">
-                    <a:lumMod val="75000"/>
-                  </a:schemeClr>
-                </a:solidFill>
-              </a:rPr>
-              <a:t>11</a:t>
-            </a:r>
-          </a:p>
-        </p:txBody>
-      </p:sp>
-      <p:sp>
-        <p:nvSpPr>
-          <p:cNvPr id="95" name="TextBox 94">
-            <a:extLst>
-              <a:ext uri="{FF2B5EF4-FFF2-40B4-BE49-F238E27FC236}">
-                <a16:creationId xmlns:a16="http://schemas.microsoft.com/office/drawing/2014/main" id="{955074F7-B7FF-8B4A-A57E-D123CD396386}"/>
-              </a:ext>
-            </a:extLst>
-          </p:cNvPr>
-          <p:cNvSpPr txBox="1"/>
-          <p:nvPr/>
-        </p:nvSpPr>
-        <p:spPr>
-          <a:xfrm>
-            <a:off x="7369991" y="3552308"/>
+            <a:off x="10991608" y="2798189"/>
             <a:ext cx="481986" cy="369332"/>
           </a:xfrm>
           <a:prstGeom prst="rect">
@@ -6298,17 +6466,17 @@
                   </a:schemeClr>
                 </a:solidFill>
               </a:rPr>
-              <a:t>12</a:t>
-            </a:r>
-          </a:p>
-        </p:txBody>
-      </p:sp>
-      <p:sp>
-        <p:nvSpPr>
-          <p:cNvPr id="96" name="TextBox 95">
-            <a:extLst>
-              <a:ext uri="{FF2B5EF4-FFF2-40B4-BE49-F238E27FC236}">
-                <a16:creationId xmlns:a16="http://schemas.microsoft.com/office/drawing/2014/main" id="{F5995287-6C5B-2049-BDBC-7533E75F350E}"/>
+              <a:t>15</a:t>
+            </a:r>
+          </a:p>
+        </p:txBody>
+      </p:sp>
+      <p:sp>
+        <p:nvSpPr>
+          <p:cNvPr id="99" name="TextBox 98">
+            <a:extLst>
+              <a:ext uri="{FF2B5EF4-FFF2-40B4-BE49-F238E27FC236}">
+                <a16:creationId xmlns:a16="http://schemas.microsoft.com/office/drawing/2014/main" id="{0CC4B71B-821E-CF40-A2BD-5C83A466D98B}"/>
               </a:ext>
             </a:extLst>
           </p:cNvPr>
@@ -6317,57 +6485,7 @@
         </p:nvSpPr>
         <p:spPr>
           <a:xfrm>
-            <a:off x="9471708" y="4040918"/>
-            <a:ext cx="481986" cy="369332"/>
-          </a:xfrm>
-          <a:prstGeom prst="rect">
-            <a:avLst/>
-          </a:prstGeom>
-          <a:solidFill>
-            <a:schemeClr val="accent2">
-              <a:lumMod val="40000"/>
-              <a:lumOff val="60000"/>
-            </a:schemeClr>
-          </a:solidFill>
-          <a:ln w="25400">
-            <a:solidFill>
-              <a:srgbClr val="C00000"/>
-            </a:solidFill>
-          </a:ln>
-        </p:spPr>
-        <p:txBody>
-          <a:bodyPr wrap="square" rtlCol="0">
-            <a:spAutoFit/>
-          </a:bodyPr>
-          <a:lstStyle/>
-          <a:p>
-            <a:pPr algn="ctr"/>
-            <a:r>
-              <a:rPr lang="en-US" b="1" dirty="0">
-                <a:solidFill>
-                  <a:srgbClr val="C00000"/>
-                </a:solidFill>
-              </a:rPr>
-              <a:t>13</a:t>
-            </a:r>
-          </a:p>
-        </p:txBody>
-      </p:sp>
-      <p:sp>
-        <p:nvSpPr>
-          <p:cNvPr id="97" name="TextBox 96">
-            <a:extLst>
-              <a:ext uri="{FF2B5EF4-FFF2-40B4-BE49-F238E27FC236}">
-                <a16:creationId xmlns:a16="http://schemas.microsoft.com/office/drawing/2014/main" id="{E713F805-3CF5-684C-81FB-5D5321772451}"/>
-              </a:ext>
-            </a:extLst>
-          </p:cNvPr>
-          <p:cNvSpPr txBox="1"/>
-          <p:nvPr/>
-        </p:nvSpPr>
-        <p:spPr>
-          <a:xfrm>
-            <a:off x="10692935" y="4898507"/>
+            <a:off x="10696505" y="3273876"/>
             <a:ext cx="481986" cy="369332"/>
           </a:xfrm>
           <a:prstGeom prst="rect">
@@ -6402,17 +6520,17 @@
                   </a:schemeClr>
                 </a:solidFill>
               </a:rPr>
-              <a:t>14</a:t>
-            </a:r>
-          </a:p>
-        </p:txBody>
-      </p:sp>
-      <p:sp>
-        <p:nvSpPr>
-          <p:cNvPr id="98" name="TextBox 97">
-            <a:extLst>
-              <a:ext uri="{FF2B5EF4-FFF2-40B4-BE49-F238E27FC236}">
-                <a16:creationId xmlns:a16="http://schemas.microsoft.com/office/drawing/2014/main" id="{4E29A9A4-6A48-9348-AF91-21BA80C6C07B}"/>
+              <a:t>16</a:t>
+            </a:r>
+          </a:p>
+        </p:txBody>
+      </p:sp>
+      <p:sp>
+        <p:nvSpPr>
+          <p:cNvPr id="101" name="TextBox 100">
+            <a:extLst>
+              <a:ext uri="{FF2B5EF4-FFF2-40B4-BE49-F238E27FC236}">
+                <a16:creationId xmlns:a16="http://schemas.microsoft.com/office/drawing/2014/main" id="{43D6964B-D4D6-5743-BB72-390BB83E816C}"/>
               </a:ext>
             </a:extLst>
           </p:cNvPr>
@@ -6421,8 +6539,8 @@
         </p:nvSpPr>
         <p:spPr>
           <a:xfrm>
-            <a:off x="10991608" y="2798189"/>
-            <a:ext cx="481986" cy="369332"/>
+            <a:off x="5238350" y="529864"/>
+            <a:ext cx="297180" cy="369332"/>
           </a:xfrm>
           <a:prstGeom prst="rect">
             <a:avLst/>
@@ -6454,106 +6572,6 @@
                   <a:schemeClr val="accent4">
                     <a:lumMod val="75000"/>
                   </a:schemeClr>
-                </a:solidFill>
-              </a:rPr>
-              <a:t>15</a:t>
-            </a:r>
-          </a:p>
-        </p:txBody>
-      </p:sp>
-      <p:sp>
-        <p:nvSpPr>
-          <p:cNvPr id="99" name="TextBox 98">
-            <a:extLst>
-              <a:ext uri="{FF2B5EF4-FFF2-40B4-BE49-F238E27FC236}">
-                <a16:creationId xmlns:a16="http://schemas.microsoft.com/office/drawing/2014/main" id="{0CC4B71B-821E-CF40-A2BD-5C83A466D98B}"/>
-              </a:ext>
-            </a:extLst>
-          </p:cNvPr>
-          <p:cNvSpPr txBox="1"/>
-          <p:nvPr/>
-        </p:nvSpPr>
-        <p:spPr>
-          <a:xfrm>
-            <a:off x="10696505" y="3273876"/>
-            <a:ext cx="481986" cy="369332"/>
-          </a:xfrm>
-          <a:prstGeom prst="rect">
-            <a:avLst/>
-          </a:prstGeom>
-          <a:solidFill>
-            <a:schemeClr val="accent2">
-              <a:lumMod val="40000"/>
-              <a:lumOff val="60000"/>
-            </a:schemeClr>
-          </a:solidFill>
-          <a:ln w="25400">
-            <a:solidFill>
-              <a:srgbClr val="C00000"/>
-            </a:solidFill>
-          </a:ln>
-        </p:spPr>
-        <p:txBody>
-          <a:bodyPr wrap="square" rtlCol="0">
-            <a:spAutoFit/>
-          </a:bodyPr>
-          <a:lstStyle/>
-          <a:p>
-            <a:pPr algn="ctr"/>
-            <a:r>
-              <a:rPr lang="en-US" b="1" dirty="0">
-                <a:solidFill>
-                  <a:srgbClr val="C00000"/>
-                </a:solidFill>
-              </a:rPr>
-              <a:t>16</a:t>
-            </a:r>
-          </a:p>
-        </p:txBody>
-      </p:sp>
-      <p:sp>
-        <p:nvSpPr>
-          <p:cNvPr id="101" name="TextBox 100">
-            <a:extLst>
-              <a:ext uri="{FF2B5EF4-FFF2-40B4-BE49-F238E27FC236}">
-                <a16:creationId xmlns:a16="http://schemas.microsoft.com/office/drawing/2014/main" id="{43D6964B-D4D6-5743-BB72-390BB83E816C}"/>
-              </a:ext>
-            </a:extLst>
-          </p:cNvPr>
-          <p:cNvSpPr txBox="1"/>
-          <p:nvPr/>
-        </p:nvSpPr>
-        <p:spPr>
-          <a:xfrm>
-            <a:off x="5238350" y="529864"/>
-            <a:ext cx="297180" cy="369332"/>
-          </a:xfrm>
-          <a:prstGeom prst="rect">
-            <a:avLst/>
-          </a:prstGeom>
-          <a:solidFill>
-            <a:schemeClr val="accent2">
-              <a:lumMod val="40000"/>
-              <a:lumOff val="60000"/>
-            </a:schemeClr>
-          </a:solidFill>
-          <a:ln w="25400">
-            <a:solidFill>
-              <a:srgbClr val="C00000"/>
-            </a:solidFill>
-          </a:ln>
-        </p:spPr>
-        <p:txBody>
-          <a:bodyPr wrap="square" rtlCol="0">
-            <a:spAutoFit/>
-          </a:bodyPr>
-          <a:lstStyle/>
-          <a:p>
-            <a:pPr algn="ctr"/>
-            <a:r>
-              <a:rPr lang="en-US" b="1" dirty="0">
-                <a:solidFill>
-                  <a:srgbClr val="C00000"/>
                 </a:solidFill>
               </a:rPr>
               <a:t>5</a:t>
@@ -7197,11 +7215,11 @@
           <a:noFill/>
           <a:ln w="25400" cap="flat" cmpd="sng" algn="ctr">
             <a:solidFill>
-              <a:schemeClr val="accent4">
+              <a:schemeClr val="accent6">
                 <a:lumMod val="75000"/>
               </a:schemeClr>
             </a:solidFill>
-            <a:prstDash val="dash"/>
+            <a:prstDash val="solid"/>
             <a:miter lim="800000"/>
             <a:tailEnd type="triangle" w="lg" len="lg"/>
           </a:ln>
@@ -7229,14 +7247,14 @@
             <a:avLst/>
           </a:prstGeom>
           <a:solidFill>
-            <a:schemeClr val="accent4">
+            <a:schemeClr val="accent6">
               <a:lumMod val="40000"/>
               <a:lumOff val="60000"/>
             </a:schemeClr>
           </a:solidFill>
           <a:ln w="25400">
             <a:solidFill>
-              <a:schemeClr val="accent4">
+              <a:schemeClr val="accent6">
                 <a:lumMod val="75000"/>
               </a:schemeClr>
             </a:solidFill>
@@ -7252,7 +7270,7 @@
             <a:r>
               <a:rPr lang="en-US" b="1" dirty="0">
                 <a:solidFill>
-                  <a:schemeClr val="accent4">
+                  <a:schemeClr val="accent6">
                     <a:lumMod val="75000"/>
                   </a:schemeClr>
                 </a:solidFill>
@@ -7290,11 +7308,11 @@
           <a:noFill/>
           <a:ln w="25400" cap="flat" cmpd="sng" algn="ctr">
             <a:solidFill>
-              <a:schemeClr val="accent4">
+              <a:schemeClr val="accent6">
                 <a:lumMod val="75000"/>
               </a:schemeClr>
             </a:solidFill>
-            <a:prstDash val="dash"/>
+            <a:prstDash val="solid"/>
             <a:miter lim="800000"/>
             <a:tailEnd type="triangle" w="lg" len="lg"/>
           </a:ln>
@@ -7322,14 +7340,14 @@
             <a:avLst/>
           </a:prstGeom>
           <a:solidFill>
-            <a:schemeClr val="accent4">
+            <a:schemeClr val="accent6">
               <a:lumMod val="40000"/>
               <a:lumOff val="60000"/>
             </a:schemeClr>
           </a:solidFill>
           <a:ln w="25400">
             <a:solidFill>
-              <a:schemeClr val="accent4">
+              <a:schemeClr val="accent6">
                 <a:lumMod val="75000"/>
               </a:schemeClr>
             </a:solidFill>
@@ -7345,7 +7363,7 @@
             <a:r>
               <a:rPr lang="en-US" b="1" dirty="0">
                 <a:solidFill>
-                  <a:schemeClr val="accent4">
+                  <a:schemeClr val="accent6">
                     <a:lumMod val="75000"/>
                   </a:schemeClr>
                 </a:solidFill>

</xml_diff>

<commit_message>
Updated forecast bias plot
</commit_message>
<xml_diff>
--- a/experiment_diagram/experiment-B-N6_interconnect.pptx
+++ b/experiment_diagram/experiment-B-N6_interconnect.pptx
@@ -817,7 +817,7 @@
           <a:p>
             <a:fld id="{50E52EA3-2204-804F-9678-85900D481E2E}" type="datetimeFigureOut">
               <a:rPr lang="en-US" smtClean="0"/>
-              <a:t>10/14/22</a:t>
+              <a:t>2/15/23</a:t>
             </a:fld>
             <a:endParaRPr lang="en-US"/>
           </a:p>
@@ -1015,7 +1015,7 @@
           <a:p>
             <a:fld id="{50E52EA3-2204-804F-9678-85900D481E2E}" type="datetimeFigureOut">
               <a:rPr lang="en-US" smtClean="0"/>
-              <a:t>10/14/22</a:t>
+              <a:t>2/15/23</a:t>
             </a:fld>
             <a:endParaRPr lang="en-US"/>
           </a:p>
@@ -1223,7 +1223,7 @@
           <a:p>
             <a:fld id="{50E52EA3-2204-804F-9678-85900D481E2E}" type="datetimeFigureOut">
               <a:rPr lang="en-US" smtClean="0"/>
-              <a:t>10/14/22</a:t>
+              <a:t>2/15/23</a:t>
             </a:fld>
             <a:endParaRPr lang="en-US"/>
           </a:p>
@@ -1421,7 +1421,7 @@
           <a:p>
             <a:fld id="{50E52EA3-2204-804F-9678-85900D481E2E}" type="datetimeFigureOut">
               <a:rPr lang="en-US" smtClean="0"/>
-              <a:t>10/14/22</a:t>
+              <a:t>2/15/23</a:t>
             </a:fld>
             <a:endParaRPr lang="en-US"/>
           </a:p>
@@ -1696,7 +1696,7 @@
           <a:p>
             <a:fld id="{50E52EA3-2204-804F-9678-85900D481E2E}" type="datetimeFigureOut">
               <a:rPr lang="en-US" smtClean="0"/>
-              <a:t>10/14/22</a:t>
+              <a:t>2/15/23</a:t>
             </a:fld>
             <a:endParaRPr lang="en-US"/>
           </a:p>
@@ -1961,7 +1961,7 @@
           <a:p>
             <a:fld id="{50E52EA3-2204-804F-9678-85900D481E2E}" type="datetimeFigureOut">
               <a:rPr lang="en-US" smtClean="0"/>
-              <a:t>10/14/22</a:t>
+              <a:t>2/15/23</a:t>
             </a:fld>
             <a:endParaRPr lang="en-US"/>
           </a:p>
@@ -2373,7 +2373,7 @@
           <a:p>
             <a:fld id="{50E52EA3-2204-804F-9678-85900D481E2E}" type="datetimeFigureOut">
               <a:rPr lang="en-US" smtClean="0"/>
-              <a:t>10/14/22</a:t>
+              <a:t>2/15/23</a:t>
             </a:fld>
             <a:endParaRPr lang="en-US"/>
           </a:p>
@@ -2514,7 +2514,7 @@
           <a:p>
             <a:fld id="{50E52EA3-2204-804F-9678-85900D481E2E}" type="datetimeFigureOut">
               <a:rPr lang="en-US" smtClean="0"/>
-              <a:t>10/14/22</a:t>
+              <a:t>2/15/23</a:t>
             </a:fld>
             <a:endParaRPr lang="en-US"/>
           </a:p>
@@ -2627,7 +2627,7 @@
           <a:p>
             <a:fld id="{50E52EA3-2204-804F-9678-85900D481E2E}" type="datetimeFigureOut">
               <a:rPr lang="en-US" smtClean="0"/>
-              <a:t>10/14/22</a:t>
+              <a:t>2/15/23</a:t>
             </a:fld>
             <a:endParaRPr lang="en-US"/>
           </a:p>
@@ -2938,7 +2938,7 @@
           <a:p>
             <a:fld id="{50E52EA3-2204-804F-9678-85900D481E2E}" type="datetimeFigureOut">
               <a:rPr lang="en-US" smtClean="0"/>
-              <a:t>10/14/22</a:t>
+              <a:t>2/15/23</a:t>
             </a:fld>
             <a:endParaRPr lang="en-US"/>
           </a:p>
@@ -3226,7 +3226,7 @@
           <a:p>
             <a:fld id="{50E52EA3-2204-804F-9678-85900D481E2E}" type="datetimeFigureOut">
               <a:rPr lang="en-US" smtClean="0"/>
-              <a:t>10/14/22</a:t>
+              <a:t>2/15/23</a:t>
             </a:fld>
             <a:endParaRPr lang="en-US"/>
           </a:p>
@@ -3467,7 +3467,7 @@
           <a:p>
             <a:fld id="{50E52EA3-2204-804F-9678-85900D481E2E}" type="datetimeFigureOut">
               <a:rPr lang="en-US" smtClean="0"/>
-              <a:t>10/14/22</a:t>
+              <a:t>2/15/23</a:t>
             </a:fld>
             <a:endParaRPr lang="en-US"/>
           </a:p>

</xml_diff>